<commit_message>
write something on LSTM
</commit_message>
<xml_diff>
--- a/DEEP LEARNING/RNN/RNN Concept.pptx
+++ b/DEEP LEARNING/RNN/RNN Concept.pptx
@@ -13,6 +13,17 @@
     <p:sldId id="262" r:id="rId7"/>
     <p:sldId id="264" r:id="rId8"/>
     <p:sldId id="263" r:id="rId9"/>
+    <p:sldId id="266" r:id="rId10"/>
+    <p:sldId id="267" r:id="rId11"/>
+    <p:sldId id="265" r:id="rId12"/>
+    <p:sldId id="268" r:id="rId13"/>
+    <p:sldId id="270" r:id="rId14"/>
+    <p:sldId id="271" r:id="rId15"/>
+    <p:sldId id="272" r:id="rId16"/>
+    <p:sldId id="273" r:id="rId17"/>
+    <p:sldId id="274" r:id="rId18"/>
+    <p:sldId id="275" r:id="rId19"/>
+    <p:sldId id="269" r:id="rId20"/>
   </p:sldIdLst>
   <p:sldSz cx="12192000" cy="6858000"/>
   <p:notesSz cx="6858000" cy="9144000"/>
@@ -268,7 +279,7 @@
           <a:p>
             <a:fld id="{7F403548-C31D-4D08-A807-E0841A304AD5}" type="datetimeFigureOut">
               <a:rPr lang="en-GB" smtClean="0"/>
-              <a:t>19/09/2023</a:t>
+              <a:t>20/09/2023</a:t>
             </a:fld>
             <a:endParaRPr lang="en-GB"/>
           </a:p>
@@ -468,7 +479,7 @@
           <a:p>
             <a:fld id="{7F403548-C31D-4D08-A807-E0841A304AD5}" type="datetimeFigureOut">
               <a:rPr lang="en-GB" smtClean="0"/>
-              <a:t>19/09/2023</a:t>
+              <a:t>20/09/2023</a:t>
             </a:fld>
             <a:endParaRPr lang="en-GB"/>
           </a:p>
@@ -678,7 +689,7 @@
           <a:p>
             <a:fld id="{7F403548-C31D-4D08-A807-E0841A304AD5}" type="datetimeFigureOut">
               <a:rPr lang="en-GB" smtClean="0"/>
-              <a:t>19/09/2023</a:t>
+              <a:t>20/09/2023</a:t>
             </a:fld>
             <a:endParaRPr lang="en-GB"/>
           </a:p>
@@ -878,7 +889,7 @@
           <a:p>
             <a:fld id="{7F403548-C31D-4D08-A807-E0841A304AD5}" type="datetimeFigureOut">
               <a:rPr lang="en-GB" smtClean="0"/>
-              <a:t>19/09/2023</a:t>
+              <a:t>20/09/2023</a:t>
             </a:fld>
             <a:endParaRPr lang="en-GB"/>
           </a:p>
@@ -1154,7 +1165,7 @@
           <a:p>
             <a:fld id="{7F403548-C31D-4D08-A807-E0841A304AD5}" type="datetimeFigureOut">
               <a:rPr lang="en-GB" smtClean="0"/>
-              <a:t>19/09/2023</a:t>
+              <a:t>20/09/2023</a:t>
             </a:fld>
             <a:endParaRPr lang="en-GB"/>
           </a:p>
@@ -1422,7 +1433,7 @@
           <a:p>
             <a:fld id="{7F403548-C31D-4D08-A807-E0841A304AD5}" type="datetimeFigureOut">
               <a:rPr lang="en-GB" smtClean="0"/>
-              <a:t>19/09/2023</a:t>
+              <a:t>20/09/2023</a:t>
             </a:fld>
             <a:endParaRPr lang="en-GB"/>
           </a:p>
@@ -1837,7 +1848,7 @@
           <a:p>
             <a:fld id="{7F403548-C31D-4D08-A807-E0841A304AD5}" type="datetimeFigureOut">
               <a:rPr lang="en-GB" smtClean="0"/>
-              <a:t>19/09/2023</a:t>
+              <a:t>20/09/2023</a:t>
             </a:fld>
             <a:endParaRPr lang="en-GB"/>
           </a:p>
@@ -1979,7 +1990,7 @@
           <a:p>
             <a:fld id="{7F403548-C31D-4D08-A807-E0841A304AD5}" type="datetimeFigureOut">
               <a:rPr lang="en-GB" smtClean="0"/>
-              <a:t>19/09/2023</a:t>
+              <a:t>20/09/2023</a:t>
             </a:fld>
             <a:endParaRPr lang="en-GB"/>
           </a:p>
@@ -2092,7 +2103,7 @@
           <a:p>
             <a:fld id="{7F403548-C31D-4D08-A807-E0841A304AD5}" type="datetimeFigureOut">
               <a:rPr lang="en-GB" smtClean="0"/>
-              <a:t>19/09/2023</a:t>
+              <a:t>20/09/2023</a:t>
             </a:fld>
             <a:endParaRPr lang="en-GB"/>
           </a:p>
@@ -2405,7 +2416,7 @@
           <a:p>
             <a:fld id="{7F403548-C31D-4D08-A807-E0841A304AD5}" type="datetimeFigureOut">
               <a:rPr lang="en-GB" smtClean="0"/>
-              <a:t>19/09/2023</a:t>
+              <a:t>20/09/2023</a:t>
             </a:fld>
             <a:endParaRPr lang="en-GB"/>
           </a:p>
@@ -2694,7 +2705,7 @@
           <a:p>
             <a:fld id="{7F403548-C31D-4D08-A807-E0841A304AD5}" type="datetimeFigureOut">
               <a:rPr lang="en-GB" smtClean="0"/>
-              <a:t>19/09/2023</a:t>
+              <a:t>20/09/2023</a:t>
             </a:fld>
             <a:endParaRPr lang="en-GB"/>
           </a:p>
@@ -2937,7 +2948,7 @@
           <a:p>
             <a:fld id="{7F403548-C31D-4D08-A807-E0841A304AD5}" type="datetimeFigureOut">
               <a:rPr lang="en-GB" smtClean="0"/>
-              <a:t>19/09/2023</a:t>
+              <a:t>20/09/2023</a:t>
             </a:fld>
             <a:endParaRPr lang="en-GB"/>
           </a:p>
@@ -3370,15 +3381,90 @@
             <p:ph type="title"/>
           </p:nvPr>
         </p:nvSpPr>
-        <p:spPr/>
+        <p:spPr>
+          <a:xfrm>
+            <a:off x="838200" y="2766218"/>
+            <a:ext cx="10515600" cy="1325563"/>
+          </a:xfrm>
+        </p:spPr>
         <p:txBody>
           <a:bodyPr/>
           <a:lstStyle/>
           <a:p>
             <a:pPr algn="ctr"/>
             <a:r>
-              <a:rPr lang="en-GB" b="1" dirty="0"/>
-              <a:t>RNN</a:t>
+              <a:rPr lang="en-GB" b="1" dirty="0">
+                <a:latin typeface="Bell MT" panose="02020503060305020303" pitchFamily="18" charset="0"/>
+              </a:rPr>
+              <a:t>RNN &amp; LSTM</a:t>
+            </a:r>
+          </a:p>
+        </p:txBody>
+      </p:sp>
+    </p:spTree>
+    <p:extLst>
+      <p:ext uri="{BB962C8B-B14F-4D97-AF65-F5344CB8AC3E}">
+        <p14:creationId xmlns:p14="http://schemas.microsoft.com/office/powerpoint/2010/main" val="1422730619"/>
+      </p:ext>
+    </p:extLst>
+  </p:cSld>
+  <p:clrMapOvr>
+    <a:masterClrMapping/>
+  </p:clrMapOvr>
+</p:sld>
+</file>
+
+<file path=ppt/slides/slide10.xml><?xml version="1.0" encoding="utf-8"?>
+<p:sld xmlns:a="http://schemas.openxmlformats.org/drawingml/2006/main" xmlns:r="http://schemas.openxmlformats.org/officeDocument/2006/relationships" xmlns:p="http://schemas.openxmlformats.org/presentationml/2006/main">
+  <p:cSld>
+    <p:spTree>
+      <p:nvGrpSpPr>
+        <p:cNvPr id="1" name=""/>
+        <p:cNvGrpSpPr/>
+        <p:nvPr/>
+      </p:nvGrpSpPr>
+      <p:grpSpPr>
+        <a:xfrm>
+          <a:off x="0" y="0"/>
+          <a:ext cx="0" cy="0"/>
+          <a:chOff x="0" y="0"/>
+          <a:chExt cx="0" cy="0"/>
+        </a:xfrm>
+      </p:grpSpPr>
+      <p:sp>
+        <p:nvSpPr>
+          <p:cNvPr id="2" name="Title 1">
+            <a:extLst>
+              <a:ext uri="{FF2B5EF4-FFF2-40B4-BE49-F238E27FC236}">
+                <a16:creationId xmlns:a16="http://schemas.microsoft.com/office/drawing/2014/main" id="{CB60FBFF-2614-4F92-9F9B-EDD5EF0A8CBE}"/>
+              </a:ext>
+            </a:extLst>
+          </p:cNvPr>
+          <p:cNvSpPr>
+            <a:spLocks noGrp="1"/>
+          </p:cNvSpPr>
+          <p:nvPr>
+            <p:ph type="title"/>
+          </p:nvPr>
+        </p:nvSpPr>
+        <p:spPr>
+          <a:xfrm>
+            <a:off x="838200" y="536575"/>
+            <a:ext cx="10515600" cy="720725"/>
+          </a:xfrm>
+        </p:spPr>
+        <p:txBody>
+          <a:bodyPr>
+            <a:normAutofit/>
+          </a:bodyPr>
+          <a:lstStyle/>
+          <a:p>
+            <a:pPr algn="ctr"/>
+            <a:r>
+              <a:rPr lang="en-GB" sz="3600" b="1" dirty="0">
+                <a:latin typeface="Bell MT" panose="02020503060305020303" pitchFamily="18" charset="0"/>
+              </a:rPr>
+              <a:t>Problem with RNN</a:t>
             </a:r>
           </a:p>
         </p:txBody>
@@ -3388,7 +3474,7 @@
           <p:cNvPr id="3" name="Content Placeholder 2">
             <a:extLst>
               <a:ext uri="{FF2B5EF4-FFF2-40B4-BE49-F238E27FC236}">
-                <a16:creationId xmlns:a16="http://schemas.microsoft.com/office/drawing/2014/main" id="{C379DD3E-35A4-4DFE-8B93-D7C2EDE1AE1F}"/>
+                <a16:creationId xmlns:a16="http://schemas.microsoft.com/office/drawing/2014/main" id="{F409F433-DA00-4F9C-92B2-0E876264A864}"/>
               </a:ext>
             </a:extLst>
           </p:cNvPr>
@@ -3399,19 +3485,3758 @@
             <p:ph idx="1"/>
           </p:nvPr>
         </p:nvSpPr>
-        <p:spPr/>
-        <p:txBody>
-          <a:bodyPr/>
+        <p:spPr>
+          <a:xfrm>
+            <a:off x="838200" y="1824831"/>
+            <a:ext cx="10515600" cy="3904457"/>
+          </a:xfrm>
+        </p:spPr>
+        <p:txBody>
+          <a:bodyPr>
+            <a:normAutofit/>
+          </a:bodyPr>
           <a:lstStyle/>
           <a:p>
-            <a:endParaRPr lang="en-GB" dirty="0"/>
+            <a:r>
+              <a:rPr lang="en-GB" sz="2000" b="1" dirty="0">
+                <a:latin typeface="Bell MT" panose="02020503060305020303" pitchFamily="18" charset="0"/>
+              </a:rPr>
+              <a:t>Lack of Selective Memory:</a:t>
+            </a:r>
+            <a:r>
+              <a:rPr lang="en-GB" sz="2000" dirty="0">
+                <a:latin typeface="Bell MT" panose="02020503060305020303" pitchFamily="18" charset="0"/>
+              </a:rPr>
+              <a:t> RNNs do not have a mechanism to selectively remember or forget information from the past. This can be a problem when the model needs to focus on relevant information and ignore irrelevant or outdated information.</a:t>
+            </a:r>
+          </a:p>
+          <a:p>
+            <a:r>
+              <a:rPr lang="en-GB" sz="2000" b="1" dirty="0">
+                <a:latin typeface="Bell MT" panose="02020503060305020303" pitchFamily="18" charset="0"/>
+              </a:rPr>
+              <a:t>Inefficient Parallelization: </a:t>
+            </a:r>
+            <a:r>
+              <a:rPr lang="en-GB" sz="2000" dirty="0">
+                <a:latin typeface="Bell MT" panose="02020503060305020303" pitchFamily="18" charset="0"/>
+              </a:rPr>
+              <a:t>RNNs are inherently sequential in nature, which makes them less efficient to parallelize compared to other architectures. This can lead to longer training times. </a:t>
+            </a:r>
+          </a:p>
+          <a:p>
+            <a:pPr marL="0" indent="0">
+              <a:buNone/>
+            </a:pPr>
+            <a:endParaRPr lang="en-GB" sz="2000" dirty="0">
+              <a:latin typeface="Bell MT" panose="02020503060305020303" pitchFamily="18" charset="0"/>
+            </a:endParaRPr>
+          </a:p>
+          <a:p>
+            <a:pPr marL="0" indent="0">
+              <a:buNone/>
+            </a:pPr>
+            <a:r>
+              <a:rPr lang="en-GB" sz="2000" dirty="0">
+                <a:latin typeface="Bell MT" panose="02020503060305020303" pitchFamily="18" charset="0"/>
+              </a:rPr>
+              <a:t>To address these problems, more advanced recurrent architectures like LSTM and GRU were introduced. LSTM, in particular, is designed to mitigate the vanishing gradient problem and has mechanisms for selectively remembering and forgetting information, making it better suited for capturing long-range dependencies in sequences.</a:t>
+            </a:r>
           </a:p>
         </p:txBody>
       </p:sp>
     </p:spTree>
     <p:extLst>
       <p:ext uri="{BB962C8B-B14F-4D97-AF65-F5344CB8AC3E}">
-        <p14:creationId xmlns:p14="http://schemas.microsoft.com/office/powerpoint/2010/main" val="1422730619"/>
+        <p14:creationId xmlns:p14="http://schemas.microsoft.com/office/powerpoint/2010/main" val="2549129532"/>
+      </p:ext>
+    </p:extLst>
+  </p:cSld>
+  <p:clrMapOvr>
+    <a:masterClrMapping/>
+  </p:clrMapOvr>
+</p:sld>
+</file>
+
+<file path=ppt/slides/slide11.xml><?xml version="1.0" encoding="utf-8"?>
+<p:sld xmlns:a="http://schemas.openxmlformats.org/drawingml/2006/main" xmlns:r="http://schemas.openxmlformats.org/officeDocument/2006/relationships" xmlns:p="http://schemas.openxmlformats.org/presentationml/2006/main">
+  <p:cSld>
+    <p:spTree>
+      <p:nvGrpSpPr>
+        <p:cNvPr id="1" name=""/>
+        <p:cNvGrpSpPr/>
+        <p:nvPr/>
+      </p:nvGrpSpPr>
+      <p:grpSpPr>
+        <a:xfrm>
+          <a:off x="0" y="0"/>
+          <a:ext cx="0" cy="0"/>
+          <a:chOff x="0" y="0"/>
+          <a:chExt cx="0" cy="0"/>
+        </a:xfrm>
+      </p:grpSpPr>
+      <p:sp>
+        <p:nvSpPr>
+          <p:cNvPr id="2" name="Title 1">
+            <a:extLst>
+              <a:ext uri="{FF2B5EF4-FFF2-40B4-BE49-F238E27FC236}">
+                <a16:creationId xmlns:a16="http://schemas.microsoft.com/office/drawing/2014/main" id="{CFABE5EB-9E83-41BA-8D1F-143C19D21BA7}"/>
+              </a:ext>
+            </a:extLst>
+          </p:cNvPr>
+          <p:cNvSpPr>
+            <a:spLocks noGrp="1"/>
+          </p:cNvSpPr>
+          <p:nvPr>
+            <p:ph type="title"/>
+          </p:nvPr>
+        </p:nvSpPr>
+        <p:spPr>
+          <a:xfrm>
+            <a:off x="838200" y="407988"/>
+            <a:ext cx="10515600" cy="749300"/>
+          </a:xfrm>
+        </p:spPr>
+        <p:txBody>
+          <a:bodyPr>
+            <a:normAutofit/>
+          </a:bodyPr>
+          <a:lstStyle/>
+          <a:p>
+            <a:pPr algn="ctr"/>
+            <a:r>
+              <a:rPr lang="en-GB" sz="3600" b="1" dirty="0">
+                <a:latin typeface="Bell MT" panose="02020503060305020303" pitchFamily="18" charset="0"/>
+              </a:rPr>
+              <a:t>LSTM</a:t>
+            </a:r>
+          </a:p>
+        </p:txBody>
+      </p:sp>
+      <p:sp>
+        <p:nvSpPr>
+          <p:cNvPr id="3" name="Content Placeholder 2">
+            <a:extLst>
+              <a:ext uri="{FF2B5EF4-FFF2-40B4-BE49-F238E27FC236}">
+                <a16:creationId xmlns:a16="http://schemas.microsoft.com/office/drawing/2014/main" id="{2961E73A-AF99-4C8F-8C7F-4C12887BFECE}"/>
+              </a:ext>
+            </a:extLst>
+          </p:cNvPr>
+          <p:cNvSpPr>
+            <a:spLocks noGrp="1"/>
+          </p:cNvSpPr>
+          <p:nvPr>
+            <p:ph idx="1"/>
+          </p:nvPr>
+        </p:nvSpPr>
+        <p:spPr>
+          <a:xfrm>
+            <a:off x="838200" y="1439862"/>
+            <a:ext cx="10515600" cy="5010150"/>
+          </a:xfrm>
+        </p:spPr>
+        <p:txBody>
+          <a:bodyPr>
+            <a:normAutofit/>
+          </a:bodyPr>
+          <a:lstStyle/>
+          <a:p>
+            <a:pPr marL="0" indent="0">
+              <a:buNone/>
+            </a:pPr>
+            <a:r>
+              <a:rPr lang="en-GB" sz="2000" dirty="0">
+                <a:latin typeface="Bell MT" panose="02020503060305020303" pitchFamily="18" charset="0"/>
+              </a:rPr>
+              <a:t>Long Short-Term Memory (LSTM) is a type of recurrent neural network (RNN) architecture that was introduced to address some of the limitations of traditional RNNs. LSTMs are specifically designed to capture long-range dependencies in sequential data and mitigate the vanishing gradient problem, which can hinder the training of RNNs. LSTMs are widely used in various applications, including natural language processing, speech recognition, and time series forecasting. Here's an overview of LSTM:</a:t>
+            </a:r>
+          </a:p>
+          <a:p>
+            <a:pPr>
+              <a:buFont typeface="Wingdings" panose="05000000000000000000" pitchFamily="2" charset="2"/>
+              <a:buChar char="Ø"/>
+            </a:pPr>
+            <a:r>
+              <a:rPr lang="en-GB" sz="2000" b="1" dirty="0">
+                <a:solidFill>
+                  <a:srgbClr val="FF0000"/>
+                </a:solidFill>
+                <a:latin typeface="Bell MT" panose="02020503060305020303" pitchFamily="18" charset="0"/>
+              </a:rPr>
+              <a:t>Memory Cells:</a:t>
+            </a:r>
+            <a:r>
+              <a:rPr lang="en-GB" sz="2000" dirty="0">
+                <a:solidFill>
+                  <a:srgbClr val="FF0000"/>
+                </a:solidFill>
+                <a:latin typeface="Bell MT" panose="02020503060305020303" pitchFamily="18" charset="0"/>
+              </a:rPr>
+              <a:t> </a:t>
+            </a:r>
+            <a:r>
+              <a:rPr lang="en-GB" sz="2000" dirty="0">
+                <a:latin typeface="Bell MT" panose="02020503060305020303" pitchFamily="18" charset="0"/>
+              </a:rPr>
+              <a:t>The core of an LSTM network is its memory cell. This cell can maintain a hidden state over a long sequence, which allows it to capture long-term dependencies. The memory cell can be thought of as a conveyor belt, where information can be added or removed, and it runs parallel to the sequence.</a:t>
+            </a:r>
+          </a:p>
+          <a:p>
+            <a:pPr>
+              <a:buFont typeface="Wingdings" panose="05000000000000000000" pitchFamily="2" charset="2"/>
+              <a:buChar char="Ø"/>
+            </a:pPr>
+            <a:r>
+              <a:rPr lang="en-GB" sz="2000" b="1" dirty="0">
+                <a:solidFill>
+                  <a:srgbClr val="FF0000"/>
+                </a:solidFill>
+                <a:latin typeface="Bell MT" panose="02020503060305020303" pitchFamily="18" charset="0"/>
+              </a:rPr>
+              <a:t>Gates:</a:t>
+            </a:r>
+            <a:r>
+              <a:rPr lang="en-GB" sz="2000" dirty="0">
+                <a:latin typeface="Bell MT" panose="02020503060305020303" pitchFamily="18" charset="0"/>
+              </a:rPr>
+              <a:t> LSTMs have three types of gates that control the flow of information into and out of the memory cell:</a:t>
+            </a:r>
+          </a:p>
+          <a:p>
+            <a:pPr lvl="1">
+              <a:buFont typeface="Wingdings" panose="05000000000000000000" pitchFamily="2" charset="2"/>
+              <a:buChar char="Ø"/>
+            </a:pPr>
+            <a:r>
+              <a:rPr lang="en-GB" sz="2000" b="1" dirty="0">
+                <a:solidFill>
+                  <a:srgbClr val="00B0F0"/>
+                </a:solidFill>
+                <a:latin typeface="Bell MT" panose="02020503060305020303" pitchFamily="18" charset="0"/>
+              </a:rPr>
+              <a:t>Forget Gate: </a:t>
+            </a:r>
+            <a:r>
+              <a:rPr lang="en-GB" sz="2000" dirty="0">
+                <a:latin typeface="Bell MT" panose="02020503060305020303" pitchFamily="18" charset="0"/>
+              </a:rPr>
+              <a:t>This gate determines what information from the previous cell state should be forgotten or retained. It takes the previous cell state and the current input as input and produces a forget gate output.</a:t>
+            </a:r>
+          </a:p>
+        </p:txBody>
+      </p:sp>
+    </p:spTree>
+    <p:extLst>
+      <p:ext uri="{BB962C8B-B14F-4D97-AF65-F5344CB8AC3E}">
+        <p14:creationId xmlns:p14="http://schemas.microsoft.com/office/powerpoint/2010/main" val="3781410724"/>
+      </p:ext>
+    </p:extLst>
+  </p:cSld>
+  <p:clrMapOvr>
+    <a:masterClrMapping/>
+  </p:clrMapOvr>
+</p:sld>
+</file>
+
+<file path=ppt/slides/slide12.xml><?xml version="1.0" encoding="utf-8"?>
+<p:sld xmlns:a="http://schemas.openxmlformats.org/drawingml/2006/main" xmlns:r="http://schemas.openxmlformats.org/officeDocument/2006/relationships" xmlns:p="http://schemas.openxmlformats.org/presentationml/2006/main">
+  <p:cSld>
+    <p:spTree>
+      <p:nvGrpSpPr>
+        <p:cNvPr id="1" name=""/>
+        <p:cNvGrpSpPr/>
+        <p:nvPr/>
+      </p:nvGrpSpPr>
+      <p:grpSpPr>
+        <a:xfrm>
+          <a:off x="0" y="0"/>
+          <a:ext cx="0" cy="0"/>
+          <a:chOff x="0" y="0"/>
+          <a:chExt cx="0" cy="0"/>
+        </a:xfrm>
+      </p:grpSpPr>
+      <p:sp>
+        <p:nvSpPr>
+          <p:cNvPr id="2" name="Title 1">
+            <a:extLst>
+              <a:ext uri="{FF2B5EF4-FFF2-40B4-BE49-F238E27FC236}">
+                <a16:creationId xmlns:a16="http://schemas.microsoft.com/office/drawing/2014/main" id="{CFABE5EB-9E83-41BA-8D1F-143C19D21BA7}"/>
+              </a:ext>
+            </a:extLst>
+          </p:cNvPr>
+          <p:cNvSpPr>
+            <a:spLocks noGrp="1"/>
+          </p:cNvSpPr>
+          <p:nvPr>
+            <p:ph type="title"/>
+          </p:nvPr>
+        </p:nvSpPr>
+        <p:spPr>
+          <a:xfrm>
+            <a:off x="838200" y="407988"/>
+            <a:ext cx="10515600" cy="749300"/>
+          </a:xfrm>
+        </p:spPr>
+        <p:txBody>
+          <a:bodyPr>
+            <a:normAutofit/>
+          </a:bodyPr>
+          <a:lstStyle/>
+          <a:p>
+            <a:pPr algn="ctr"/>
+            <a:r>
+              <a:rPr lang="en-GB" sz="3600" b="1" dirty="0">
+                <a:latin typeface="Bell MT" panose="02020503060305020303" pitchFamily="18" charset="0"/>
+              </a:rPr>
+              <a:t>LSTM</a:t>
+            </a:r>
+          </a:p>
+        </p:txBody>
+      </p:sp>
+      <p:sp>
+        <p:nvSpPr>
+          <p:cNvPr id="3" name="Content Placeholder 2">
+            <a:extLst>
+              <a:ext uri="{FF2B5EF4-FFF2-40B4-BE49-F238E27FC236}">
+                <a16:creationId xmlns:a16="http://schemas.microsoft.com/office/drawing/2014/main" id="{2961E73A-AF99-4C8F-8C7F-4C12887BFECE}"/>
+              </a:ext>
+            </a:extLst>
+          </p:cNvPr>
+          <p:cNvSpPr>
+            <a:spLocks noGrp="1"/>
+          </p:cNvSpPr>
+          <p:nvPr>
+            <p:ph idx="1"/>
+          </p:nvPr>
+        </p:nvSpPr>
+        <p:spPr>
+          <a:xfrm>
+            <a:off x="838200" y="1439862"/>
+            <a:ext cx="10515600" cy="5010150"/>
+          </a:xfrm>
+        </p:spPr>
+        <p:txBody>
+          <a:bodyPr>
+            <a:normAutofit/>
+          </a:bodyPr>
+          <a:lstStyle/>
+          <a:p>
+            <a:pPr>
+              <a:buFont typeface="Wingdings" panose="05000000000000000000" pitchFamily="2" charset="2"/>
+              <a:buChar char="Ø"/>
+            </a:pPr>
+            <a:r>
+              <a:rPr lang="en-GB" sz="2000" b="1" dirty="0">
+                <a:solidFill>
+                  <a:srgbClr val="00B0F0"/>
+                </a:solidFill>
+                <a:latin typeface="Bell MT" panose="02020503060305020303" pitchFamily="18" charset="0"/>
+              </a:rPr>
+              <a:t>Input Gate: </a:t>
+            </a:r>
+            <a:r>
+              <a:rPr lang="en-GB" sz="2000" dirty="0">
+                <a:latin typeface="Bell MT" panose="02020503060305020303" pitchFamily="18" charset="0"/>
+              </a:rPr>
+              <a:t>This gate decides what new information should be stored in the memory cell. It takes the current input and produces an input gate output.</a:t>
+            </a:r>
+          </a:p>
+          <a:p>
+            <a:pPr>
+              <a:buFont typeface="Wingdings" panose="05000000000000000000" pitchFamily="2" charset="2"/>
+              <a:buChar char="Ø"/>
+            </a:pPr>
+            <a:r>
+              <a:rPr lang="en-GB" sz="2000" b="1" dirty="0">
+                <a:solidFill>
+                  <a:srgbClr val="00B0F0"/>
+                </a:solidFill>
+                <a:latin typeface="Bell MT" panose="02020503060305020303" pitchFamily="18" charset="0"/>
+              </a:rPr>
+              <a:t>Output Gate: </a:t>
+            </a:r>
+            <a:r>
+              <a:rPr lang="en-GB" sz="2000" dirty="0">
+                <a:latin typeface="Bell MT" panose="02020503060305020303" pitchFamily="18" charset="0"/>
+              </a:rPr>
+              <a:t>The output gate determines what information from the current cell state should be passed to the output. It considers the current input and the cell state to produce the output gate output.</a:t>
+            </a:r>
+          </a:p>
+          <a:p>
+            <a:pPr>
+              <a:buFont typeface="Wingdings" panose="05000000000000000000" pitchFamily="2" charset="2"/>
+              <a:buChar char="Ø"/>
+            </a:pPr>
+            <a:r>
+              <a:rPr lang="en-GB" sz="2000" b="1" dirty="0">
+                <a:solidFill>
+                  <a:srgbClr val="FF0000"/>
+                </a:solidFill>
+                <a:latin typeface="Bell MT" panose="02020503060305020303" pitchFamily="18" charset="0"/>
+              </a:rPr>
+              <a:t>Cell State: </a:t>
+            </a:r>
+            <a:r>
+              <a:rPr lang="en-GB" sz="2000" dirty="0">
+                <a:latin typeface="Bell MT" panose="02020503060305020303" pitchFamily="18" charset="0"/>
+              </a:rPr>
+              <a:t>The memory cell maintains a cell state, which can be thought of as a kind of internal memory. The cell state can be updated using the information from the input gate and the forget gate. This allows the network to remember or forget information selectively.</a:t>
+            </a:r>
+          </a:p>
+          <a:p>
+            <a:pPr>
+              <a:buFont typeface="Wingdings" panose="05000000000000000000" pitchFamily="2" charset="2"/>
+              <a:buChar char="Ø"/>
+            </a:pPr>
+            <a:r>
+              <a:rPr lang="en-GB" sz="2000" b="1" dirty="0">
+                <a:solidFill>
+                  <a:srgbClr val="FF0000"/>
+                </a:solidFill>
+                <a:latin typeface="Bell MT" panose="02020503060305020303" pitchFamily="18" charset="0"/>
+              </a:rPr>
+              <a:t>Hidden State: </a:t>
+            </a:r>
+            <a:r>
+              <a:rPr lang="en-GB" sz="2000" dirty="0">
+                <a:latin typeface="Bell MT" panose="02020503060305020303" pitchFamily="18" charset="0"/>
+              </a:rPr>
+              <a:t>The LSTM also has a hidden state that can be thought of as the output of the LSTM at each time step. The hidden state is produced using the cell state and the output gate.</a:t>
+            </a:r>
+          </a:p>
+          <a:p>
+            <a:pPr marL="0" indent="0">
+              <a:buNone/>
+            </a:pPr>
+            <a:endParaRPr lang="en-GB" sz="1800" dirty="0">
+              <a:latin typeface="Bell MT" panose="02020503060305020303" pitchFamily="18" charset="0"/>
+            </a:endParaRPr>
+          </a:p>
+          <a:p>
+            <a:pPr marL="0" indent="0">
+              <a:buNone/>
+            </a:pPr>
+            <a:r>
+              <a:rPr lang="en-GB" sz="2000" dirty="0">
+                <a:latin typeface="Bell MT" panose="02020503060305020303" pitchFamily="18" charset="0"/>
+              </a:rPr>
+              <a:t>The key advantages of LSTMs are their ability to capture long-term dependencies and their resistance to the vanishing gradient problem. The gates in LSTMs allow them to regulate the flow of information, making them well-suited for tasks that involve sequences of data where information from the distant past is relevant to the present.</a:t>
+            </a:r>
+          </a:p>
+        </p:txBody>
+      </p:sp>
+    </p:spTree>
+    <p:extLst>
+      <p:ext uri="{BB962C8B-B14F-4D97-AF65-F5344CB8AC3E}">
+        <p14:creationId xmlns:p14="http://schemas.microsoft.com/office/powerpoint/2010/main" val="2960399395"/>
+      </p:ext>
+    </p:extLst>
+  </p:cSld>
+  <p:clrMapOvr>
+    <a:masterClrMapping/>
+  </p:clrMapOvr>
+</p:sld>
+</file>
+
+<file path=ppt/slides/slide13.xml><?xml version="1.0" encoding="utf-8"?>
+<p:sld xmlns:a="http://schemas.openxmlformats.org/drawingml/2006/main" xmlns:r="http://schemas.openxmlformats.org/officeDocument/2006/relationships" xmlns:p="http://schemas.openxmlformats.org/presentationml/2006/main">
+  <p:cSld>
+    <p:spTree>
+      <p:nvGrpSpPr>
+        <p:cNvPr id="1" name=""/>
+        <p:cNvGrpSpPr/>
+        <p:nvPr/>
+      </p:nvGrpSpPr>
+      <p:grpSpPr>
+        <a:xfrm>
+          <a:off x="0" y="0"/>
+          <a:ext cx="0" cy="0"/>
+          <a:chOff x="0" y="0"/>
+          <a:chExt cx="0" cy="0"/>
+        </a:xfrm>
+      </p:grpSpPr>
+      <p:sp>
+        <p:nvSpPr>
+          <p:cNvPr id="2" name="Title 1">
+            <a:extLst>
+              <a:ext uri="{FF2B5EF4-FFF2-40B4-BE49-F238E27FC236}">
+                <a16:creationId xmlns:a16="http://schemas.microsoft.com/office/drawing/2014/main" id="{CFABE5EB-9E83-41BA-8D1F-143C19D21BA7}"/>
+              </a:ext>
+            </a:extLst>
+          </p:cNvPr>
+          <p:cNvSpPr>
+            <a:spLocks noGrp="1"/>
+          </p:cNvSpPr>
+          <p:nvPr>
+            <p:ph type="title"/>
+          </p:nvPr>
+        </p:nvSpPr>
+        <p:spPr>
+          <a:xfrm>
+            <a:off x="838200" y="407988"/>
+            <a:ext cx="10515600" cy="749300"/>
+          </a:xfrm>
+        </p:spPr>
+        <p:txBody>
+          <a:bodyPr>
+            <a:normAutofit/>
+          </a:bodyPr>
+          <a:lstStyle/>
+          <a:p>
+            <a:pPr algn="ctr"/>
+            <a:r>
+              <a:rPr lang="en-GB" sz="3600" b="1" dirty="0">
+                <a:latin typeface="Bell MT" panose="02020503060305020303" pitchFamily="18" charset="0"/>
+              </a:rPr>
+              <a:t>LSTM Architecture</a:t>
+            </a:r>
+          </a:p>
+        </p:txBody>
+      </p:sp>
+      <p:pic>
+        <p:nvPicPr>
+          <p:cNvPr id="7" name="Picture 6">
+            <a:extLst>
+              <a:ext uri="{FF2B5EF4-FFF2-40B4-BE49-F238E27FC236}">
+                <a16:creationId xmlns:a16="http://schemas.microsoft.com/office/drawing/2014/main" id="{149D33E3-B4B0-41AD-95BE-CC964E7B79A1}"/>
+              </a:ext>
+            </a:extLst>
+          </p:cNvPr>
+          <p:cNvPicPr>
+            <a:picLocks noChangeAspect="1"/>
+          </p:cNvPicPr>
+          <p:nvPr/>
+        </p:nvPicPr>
+        <p:blipFill>
+          <a:blip r:embed="rId2"/>
+          <a:stretch>
+            <a:fillRect/>
+          </a:stretch>
+        </p:blipFill>
+        <p:spPr>
+          <a:xfrm>
+            <a:off x="1109150" y="1385888"/>
+            <a:ext cx="8930200" cy="3505403"/>
+          </a:xfrm>
+          <a:prstGeom prst="rect">
+            <a:avLst/>
+          </a:prstGeom>
+        </p:spPr>
+      </p:pic>
+      <p:pic>
+        <p:nvPicPr>
+          <p:cNvPr id="9" name="Picture 8">
+            <a:extLst>
+              <a:ext uri="{FF2B5EF4-FFF2-40B4-BE49-F238E27FC236}">
+                <a16:creationId xmlns:a16="http://schemas.microsoft.com/office/drawing/2014/main" id="{788D9FA0-F3ED-45D0-BA5E-2C22345736D2}"/>
+              </a:ext>
+            </a:extLst>
+          </p:cNvPr>
+          <p:cNvPicPr>
+            <a:picLocks noChangeAspect="1"/>
+          </p:cNvPicPr>
+          <p:nvPr/>
+        </p:nvPicPr>
+        <p:blipFill>
+          <a:blip r:embed="rId3"/>
+          <a:stretch>
+            <a:fillRect/>
+          </a:stretch>
+        </p:blipFill>
+        <p:spPr>
+          <a:xfrm>
+            <a:off x="2887825" y="5311621"/>
+            <a:ext cx="5372850" cy="1095528"/>
+          </a:xfrm>
+          <a:prstGeom prst="rect">
+            <a:avLst/>
+          </a:prstGeom>
+        </p:spPr>
+      </p:pic>
+    </p:spTree>
+    <p:extLst>
+      <p:ext uri="{BB962C8B-B14F-4D97-AF65-F5344CB8AC3E}">
+        <p14:creationId xmlns:p14="http://schemas.microsoft.com/office/powerpoint/2010/main" val="3126197733"/>
+      </p:ext>
+    </p:extLst>
+  </p:cSld>
+  <p:clrMapOvr>
+    <a:masterClrMapping/>
+  </p:clrMapOvr>
+</p:sld>
+</file>
+
+<file path=ppt/slides/slide14.xml><?xml version="1.0" encoding="utf-8"?>
+<p:sld xmlns:a="http://schemas.openxmlformats.org/drawingml/2006/main" xmlns:r="http://schemas.openxmlformats.org/officeDocument/2006/relationships" xmlns:p="http://schemas.openxmlformats.org/presentationml/2006/main">
+  <p:cSld>
+    <p:spTree>
+      <p:nvGrpSpPr>
+        <p:cNvPr id="1" name=""/>
+        <p:cNvGrpSpPr/>
+        <p:nvPr/>
+      </p:nvGrpSpPr>
+      <p:grpSpPr>
+        <a:xfrm>
+          <a:off x="0" y="0"/>
+          <a:ext cx="0" cy="0"/>
+          <a:chOff x="0" y="0"/>
+          <a:chExt cx="0" cy="0"/>
+        </a:xfrm>
+      </p:grpSpPr>
+      <p:sp>
+        <p:nvSpPr>
+          <p:cNvPr id="2" name="Title 1">
+            <a:extLst>
+              <a:ext uri="{FF2B5EF4-FFF2-40B4-BE49-F238E27FC236}">
+                <a16:creationId xmlns:a16="http://schemas.microsoft.com/office/drawing/2014/main" id="{CFABE5EB-9E83-41BA-8D1F-143C19D21BA7}"/>
+              </a:ext>
+            </a:extLst>
+          </p:cNvPr>
+          <p:cNvSpPr>
+            <a:spLocks noGrp="1"/>
+          </p:cNvSpPr>
+          <p:nvPr>
+            <p:ph type="title"/>
+          </p:nvPr>
+        </p:nvSpPr>
+        <p:spPr>
+          <a:xfrm>
+            <a:off x="838200" y="407988"/>
+            <a:ext cx="10515600" cy="749300"/>
+          </a:xfrm>
+        </p:spPr>
+        <p:txBody>
+          <a:bodyPr>
+            <a:normAutofit/>
+          </a:bodyPr>
+          <a:lstStyle/>
+          <a:p>
+            <a:pPr algn="ctr"/>
+            <a:r>
+              <a:rPr lang="en-GB" sz="3600" b="1" dirty="0">
+                <a:latin typeface="Bell MT" panose="02020503060305020303" pitchFamily="18" charset="0"/>
+              </a:rPr>
+              <a:t>LSTM State</a:t>
+            </a:r>
+          </a:p>
+        </p:txBody>
+      </p:sp>
+      <p:pic>
+        <p:nvPicPr>
+          <p:cNvPr id="1028" name="Picture 4">
+            <a:extLst>
+              <a:ext uri="{FF2B5EF4-FFF2-40B4-BE49-F238E27FC236}">
+                <a16:creationId xmlns:a16="http://schemas.microsoft.com/office/drawing/2014/main" id="{0CD8D62E-184E-4F97-9737-E7401D497DD3}"/>
+              </a:ext>
+            </a:extLst>
+          </p:cNvPr>
+          <p:cNvPicPr>
+            <a:picLocks noChangeAspect="1" noChangeArrowheads="1"/>
+          </p:cNvPicPr>
+          <p:nvPr/>
+        </p:nvPicPr>
+        <p:blipFill>
+          <a:blip r:embed="rId2">
+            <a:extLst>
+              <a:ext uri="{28A0092B-C50C-407E-A947-70E740481C1C}">
+                <a14:useLocalDpi xmlns:a14="http://schemas.microsoft.com/office/drawing/2010/main" val="0"/>
+              </a:ext>
+            </a:extLst>
+          </a:blip>
+          <a:srcRect/>
+          <a:stretch>
+            <a:fillRect/>
+          </a:stretch>
+        </p:blipFill>
+        <p:spPr bwMode="auto">
+          <a:xfrm>
+            <a:off x="1866900" y="1624013"/>
+            <a:ext cx="8458200" cy="4610100"/>
+          </a:xfrm>
+          <a:prstGeom prst="rect">
+            <a:avLst/>
+          </a:prstGeom>
+          <a:noFill/>
+          <a:extLst>
+            <a:ext uri="{909E8E84-426E-40DD-AFC4-6F175D3DCCD1}">
+              <a14:hiddenFill xmlns:a14="http://schemas.microsoft.com/office/drawing/2010/main">
+                <a:solidFill>
+                  <a:srgbClr val="FFFFFF"/>
+                </a:solidFill>
+              </a14:hiddenFill>
+            </a:ext>
+          </a:extLst>
+        </p:spPr>
+      </p:pic>
+      <p:sp>
+        <p:nvSpPr>
+          <p:cNvPr id="5" name="Rectangle: Rounded Corners 4">
+            <a:extLst>
+              <a:ext uri="{FF2B5EF4-FFF2-40B4-BE49-F238E27FC236}">
+                <a16:creationId xmlns:a16="http://schemas.microsoft.com/office/drawing/2014/main" id="{03315F5A-453C-4E12-89F3-5463B207C60A}"/>
+              </a:ext>
+            </a:extLst>
+          </p:cNvPr>
+          <p:cNvSpPr/>
+          <p:nvPr/>
+        </p:nvSpPr>
+        <p:spPr>
+          <a:xfrm>
+            <a:off x="3700463" y="2928938"/>
+            <a:ext cx="4957762" cy="314325"/>
+          </a:xfrm>
+          <a:prstGeom prst="roundRect">
+            <a:avLst/>
+          </a:prstGeom>
+          <a:noFill/>
+          <a:ln w="28575">
+            <a:solidFill>
+              <a:srgbClr val="FF0000"/>
+            </a:solidFill>
+            <a:prstDash val="sysDot"/>
+          </a:ln>
+        </p:spPr>
+        <p:style>
+          <a:lnRef idx="2">
+            <a:schemeClr val="accent1">
+              <a:shade val="50000"/>
+            </a:schemeClr>
+          </a:lnRef>
+          <a:fillRef idx="1">
+            <a:schemeClr val="accent1"/>
+          </a:fillRef>
+          <a:effectRef idx="0">
+            <a:schemeClr val="accent1"/>
+          </a:effectRef>
+          <a:fontRef idx="minor">
+            <a:schemeClr val="lt1"/>
+          </a:fontRef>
+        </p:style>
+        <p:txBody>
+          <a:bodyPr rtlCol="0" anchor="ctr"/>
+          <a:lstStyle/>
+          <a:p>
+            <a:pPr algn="ctr"/>
+            <a:endParaRPr lang="en-GB"/>
+          </a:p>
+        </p:txBody>
+      </p:sp>
+      <p:cxnSp>
+        <p:nvCxnSpPr>
+          <p:cNvPr id="8" name="Straight Connector 7">
+            <a:extLst>
+              <a:ext uri="{FF2B5EF4-FFF2-40B4-BE49-F238E27FC236}">
+                <a16:creationId xmlns:a16="http://schemas.microsoft.com/office/drawing/2014/main" id="{E0C74BC5-CD3C-4F1C-BB7F-2DB211801ACF}"/>
+              </a:ext>
+            </a:extLst>
+          </p:cNvPr>
+          <p:cNvCxnSpPr>
+            <a:endCxn id="5" idx="1"/>
+          </p:cNvCxnSpPr>
+          <p:nvPr/>
+        </p:nvCxnSpPr>
+        <p:spPr>
+          <a:xfrm>
+            <a:off x="3300413" y="3057525"/>
+            <a:ext cx="400050" cy="28576"/>
+          </a:xfrm>
+          <a:prstGeom prst="line">
+            <a:avLst/>
+          </a:prstGeom>
+          <a:ln w="19050"/>
+        </p:spPr>
+        <p:style>
+          <a:lnRef idx="1">
+            <a:schemeClr val="dk1"/>
+          </a:lnRef>
+          <a:fillRef idx="0">
+            <a:schemeClr val="dk1"/>
+          </a:fillRef>
+          <a:effectRef idx="0">
+            <a:schemeClr val="dk1"/>
+          </a:effectRef>
+          <a:fontRef idx="minor">
+            <a:schemeClr val="tx1"/>
+          </a:fontRef>
+        </p:style>
+      </p:cxnSp>
+      <p:sp>
+        <p:nvSpPr>
+          <p:cNvPr id="12" name="Rectangle: Rounded Corners 11">
+            <a:extLst>
+              <a:ext uri="{FF2B5EF4-FFF2-40B4-BE49-F238E27FC236}">
+                <a16:creationId xmlns:a16="http://schemas.microsoft.com/office/drawing/2014/main" id="{F99D935E-BFFB-4670-812D-38434074C8C1}"/>
+              </a:ext>
+            </a:extLst>
+          </p:cNvPr>
+          <p:cNvSpPr/>
+          <p:nvPr/>
+        </p:nvSpPr>
+        <p:spPr>
+          <a:xfrm>
+            <a:off x="3700463" y="4676775"/>
+            <a:ext cx="4957762" cy="314325"/>
+          </a:xfrm>
+          <a:prstGeom prst="roundRect">
+            <a:avLst/>
+          </a:prstGeom>
+          <a:noFill/>
+          <a:ln w="28575">
+            <a:solidFill>
+              <a:srgbClr val="00B050"/>
+            </a:solidFill>
+            <a:prstDash val="sysDot"/>
+          </a:ln>
+        </p:spPr>
+        <p:style>
+          <a:lnRef idx="2">
+            <a:schemeClr val="accent1">
+              <a:shade val="50000"/>
+            </a:schemeClr>
+          </a:lnRef>
+          <a:fillRef idx="1">
+            <a:schemeClr val="accent1"/>
+          </a:fillRef>
+          <a:effectRef idx="0">
+            <a:schemeClr val="accent1"/>
+          </a:effectRef>
+          <a:fontRef idx="minor">
+            <a:schemeClr val="lt1"/>
+          </a:fontRef>
+        </p:style>
+        <p:txBody>
+          <a:bodyPr rtlCol="0" anchor="ctr"/>
+          <a:lstStyle/>
+          <a:p>
+            <a:pPr algn="ctr"/>
+            <a:endParaRPr lang="en-GB"/>
+          </a:p>
+        </p:txBody>
+      </p:sp>
+      <p:cxnSp>
+        <p:nvCxnSpPr>
+          <p:cNvPr id="11" name="Straight Connector 10">
+            <a:extLst>
+              <a:ext uri="{FF2B5EF4-FFF2-40B4-BE49-F238E27FC236}">
+                <a16:creationId xmlns:a16="http://schemas.microsoft.com/office/drawing/2014/main" id="{33E15139-273C-44E7-99E0-8E07A3C2E064}"/>
+              </a:ext>
+            </a:extLst>
+          </p:cNvPr>
+          <p:cNvCxnSpPr>
+            <a:cxnSpLocks/>
+            <a:endCxn id="12" idx="1"/>
+          </p:cNvCxnSpPr>
+          <p:nvPr/>
+        </p:nvCxnSpPr>
+        <p:spPr>
+          <a:xfrm>
+            <a:off x="3300413" y="4833938"/>
+            <a:ext cx="400050" cy="0"/>
+          </a:xfrm>
+          <a:prstGeom prst="line">
+            <a:avLst/>
+          </a:prstGeom>
+          <a:ln w="19050"/>
+        </p:spPr>
+        <p:style>
+          <a:lnRef idx="1">
+            <a:schemeClr val="dk1"/>
+          </a:lnRef>
+          <a:fillRef idx="0">
+            <a:schemeClr val="dk1"/>
+          </a:fillRef>
+          <a:effectRef idx="0">
+            <a:schemeClr val="dk1"/>
+          </a:effectRef>
+          <a:fontRef idx="minor">
+            <a:schemeClr val="tx1"/>
+          </a:fontRef>
+        </p:style>
+      </p:cxnSp>
+    </p:spTree>
+    <p:extLst>
+      <p:ext uri="{BB962C8B-B14F-4D97-AF65-F5344CB8AC3E}">
+        <p14:creationId xmlns:p14="http://schemas.microsoft.com/office/powerpoint/2010/main" val="217101414"/>
+      </p:ext>
+    </p:extLst>
+  </p:cSld>
+  <p:clrMapOvr>
+    <a:masterClrMapping/>
+  </p:clrMapOvr>
+</p:sld>
+</file>
+
+<file path=ppt/slides/slide15.xml><?xml version="1.0" encoding="utf-8"?>
+<p:sld xmlns:a="http://schemas.openxmlformats.org/drawingml/2006/main" xmlns:r="http://schemas.openxmlformats.org/officeDocument/2006/relationships" xmlns:p="http://schemas.openxmlformats.org/presentationml/2006/main">
+  <p:cSld>
+    <p:spTree>
+      <p:nvGrpSpPr>
+        <p:cNvPr id="1" name=""/>
+        <p:cNvGrpSpPr/>
+        <p:nvPr/>
+      </p:nvGrpSpPr>
+      <p:grpSpPr>
+        <a:xfrm>
+          <a:off x="0" y="0"/>
+          <a:ext cx="0" cy="0"/>
+          <a:chOff x="0" y="0"/>
+          <a:chExt cx="0" cy="0"/>
+        </a:xfrm>
+      </p:grpSpPr>
+      <p:sp>
+        <p:nvSpPr>
+          <p:cNvPr id="2" name="Title 1">
+            <a:extLst>
+              <a:ext uri="{FF2B5EF4-FFF2-40B4-BE49-F238E27FC236}">
+                <a16:creationId xmlns:a16="http://schemas.microsoft.com/office/drawing/2014/main" id="{CFABE5EB-9E83-41BA-8D1F-143C19D21BA7}"/>
+              </a:ext>
+            </a:extLst>
+          </p:cNvPr>
+          <p:cNvSpPr>
+            <a:spLocks noGrp="1"/>
+          </p:cNvSpPr>
+          <p:nvPr>
+            <p:ph type="title"/>
+          </p:nvPr>
+        </p:nvSpPr>
+        <p:spPr>
+          <a:xfrm>
+            <a:off x="838200" y="407988"/>
+            <a:ext cx="10515600" cy="749300"/>
+          </a:xfrm>
+        </p:spPr>
+        <p:txBody>
+          <a:bodyPr>
+            <a:normAutofit/>
+          </a:bodyPr>
+          <a:lstStyle/>
+          <a:p>
+            <a:pPr algn="ctr"/>
+            <a:r>
+              <a:rPr lang="en-GB" sz="3600" b="1" dirty="0">
+                <a:latin typeface="Bell MT" panose="02020503060305020303" pitchFamily="18" charset="0"/>
+              </a:rPr>
+              <a:t>LSTM State</a:t>
+            </a:r>
+          </a:p>
+        </p:txBody>
+      </p:sp>
+      <p:pic>
+        <p:nvPicPr>
+          <p:cNvPr id="4" name="Picture 3">
+            <a:extLst>
+              <a:ext uri="{FF2B5EF4-FFF2-40B4-BE49-F238E27FC236}">
+                <a16:creationId xmlns:a16="http://schemas.microsoft.com/office/drawing/2014/main" id="{81D79108-4311-4ECD-B3D3-DCC6A9F07673}"/>
+              </a:ext>
+            </a:extLst>
+          </p:cNvPr>
+          <p:cNvPicPr>
+            <a:picLocks noChangeAspect="1"/>
+          </p:cNvPicPr>
+          <p:nvPr/>
+        </p:nvPicPr>
+        <p:blipFill>
+          <a:blip r:embed="rId2"/>
+          <a:stretch>
+            <a:fillRect/>
+          </a:stretch>
+        </p:blipFill>
+        <p:spPr>
+          <a:xfrm>
+            <a:off x="1875995" y="1323709"/>
+            <a:ext cx="8053818" cy="4986884"/>
+          </a:xfrm>
+          <a:prstGeom prst="rect">
+            <a:avLst/>
+          </a:prstGeom>
+        </p:spPr>
+      </p:pic>
+    </p:spTree>
+    <p:extLst>
+      <p:ext uri="{BB962C8B-B14F-4D97-AF65-F5344CB8AC3E}">
+        <p14:creationId xmlns:p14="http://schemas.microsoft.com/office/powerpoint/2010/main" val="1810573379"/>
+      </p:ext>
+    </p:extLst>
+  </p:cSld>
+  <p:clrMapOvr>
+    <a:masterClrMapping/>
+  </p:clrMapOvr>
+</p:sld>
+</file>
+
+<file path=ppt/slides/slide16.xml><?xml version="1.0" encoding="utf-8"?>
+<p:sld xmlns:a="http://schemas.openxmlformats.org/drawingml/2006/main" xmlns:r="http://schemas.openxmlformats.org/officeDocument/2006/relationships" xmlns:p="http://schemas.openxmlformats.org/presentationml/2006/main">
+  <p:cSld>
+    <p:spTree>
+      <p:nvGrpSpPr>
+        <p:cNvPr id="1" name=""/>
+        <p:cNvGrpSpPr/>
+        <p:nvPr/>
+      </p:nvGrpSpPr>
+      <p:grpSpPr>
+        <a:xfrm>
+          <a:off x="0" y="0"/>
+          <a:ext cx="0" cy="0"/>
+          <a:chOff x="0" y="0"/>
+          <a:chExt cx="0" cy="0"/>
+        </a:xfrm>
+      </p:grpSpPr>
+      <p:sp>
+        <p:nvSpPr>
+          <p:cNvPr id="2" name="Title 1">
+            <a:extLst>
+              <a:ext uri="{FF2B5EF4-FFF2-40B4-BE49-F238E27FC236}">
+                <a16:creationId xmlns:a16="http://schemas.microsoft.com/office/drawing/2014/main" id="{CFABE5EB-9E83-41BA-8D1F-143C19D21BA7}"/>
+              </a:ext>
+            </a:extLst>
+          </p:cNvPr>
+          <p:cNvSpPr>
+            <a:spLocks noGrp="1"/>
+          </p:cNvSpPr>
+          <p:nvPr>
+            <p:ph type="title"/>
+          </p:nvPr>
+        </p:nvSpPr>
+        <p:spPr>
+          <a:xfrm>
+            <a:off x="838200" y="407988"/>
+            <a:ext cx="10515600" cy="749300"/>
+          </a:xfrm>
+        </p:spPr>
+        <p:txBody>
+          <a:bodyPr>
+            <a:normAutofit/>
+          </a:bodyPr>
+          <a:lstStyle/>
+          <a:p>
+            <a:pPr algn="ctr"/>
+            <a:r>
+              <a:rPr lang="en-GB" sz="3600" b="1" dirty="0">
+                <a:latin typeface="Bell MT" panose="02020503060305020303" pitchFamily="18" charset="0"/>
+              </a:rPr>
+              <a:t>LSTM State</a:t>
+            </a:r>
+          </a:p>
+        </p:txBody>
+      </p:sp>
+      <p:pic>
+        <p:nvPicPr>
+          <p:cNvPr id="2050" name="Picture 2" descr="Bài 14: Long short term memory (LSTM) | Deep Learning cơ bản">
+            <a:extLst>
+              <a:ext uri="{FF2B5EF4-FFF2-40B4-BE49-F238E27FC236}">
+                <a16:creationId xmlns:a16="http://schemas.microsoft.com/office/drawing/2014/main" id="{FEC722D8-1E6A-4086-ACCB-A495D1C08DC3}"/>
+              </a:ext>
+            </a:extLst>
+          </p:cNvPr>
+          <p:cNvPicPr>
+            <a:picLocks noChangeAspect="1" noChangeArrowheads="1"/>
+          </p:cNvPicPr>
+          <p:nvPr/>
+        </p:nvPicPr>
+        <p:blipFill>
+          <a:blip r:embed="rId2">
+            <a:extLst>
+              <a:ext uri="{28A0092B-C50C-407E-A947-70E740481C1C}">
+                <a14:useLocalDpi xmlns:a14="http://schemas.microsoft.com/office/drawing/2010/main" val="0"/>
+              </a:ext>
+            </a:extLst>
+          </a:blip>
+          <a:srcRect/>
+          <a:stretch>
+            <a:fillRect/>
+          </a:stretch>
+        </p:blipFill>
+        <p:spPr bwMode="auto">
+          <a:xfrm>
+            <a:off x="376239" y="1157288"/>
+            <a:ext cx="5324475" cy="3219450"/>
+          </a:xfrm>
+          <a:prstGeom prst="rect">
+            <a:avLst/>
+          </a:prstGeom>
+          <a:noFill/>
+          <a:extLst>
+            <a:ext uri="{909E8E84-426E-40DD-AFC4-6F175D3DCCD1}">
+              <a14:hiddenFill xmlns:a14="http://schemas.microsoft.com/office/drawing/2010/main">
+                <a:solidFill>
+                  <a:srgbClr val="FFFFFF"/>
+                </a:solidFill>
+              </a14:hiddenFill>
+            </a:ext>
+          </a:extLst>
+        </p:spPr>
+      </p:pic>
+      <mc:AlternateContent xmlns:mc="http://schemas.openxmlformats.org/markup-compatibility/2006">
+        <mc:Choice xmlns:a14="http://schemas.microsoft.com/office/drawing/2010/main" Requires="a14">
+          <p:sp>
+            <p:nvSpPr>
+              <p:cNvPr id="3" name="TextBox 2">
+                <a:extLst>
+                  <a:ext uri="{FF2B5EF4-FFF2-40B4-BE49-F238E27FC236}">
+                    <a16:creationId xmlns:a16="http://schemas.microsoft.com/office/drawing/2014/main" id="{99F66C22-92FA-41B4-959D-2B65BE6079EF}"/>
+                  </a:ext>
+                </a:extLst>
+              </p:cNvPr>
+              <p:cNvSpPr txBox="1"/>
+              <p:nvPr/>
+            </p:nvSpPr>
+            <p:spPr>
+              <a:xfrm>
+                <a:off x="5700714" y="1371600"/>
+                <a:ext cx="5252464" cy="553998"/>
+              </a:xfrm>
+              <a:prstGeom prst="rect">
+                <a:avLst/>
+              </a:prstGeom>
+              <a:noFill/>
+            </p:spPr>
+            <p:txBody>
+              <a:bodyPr wrap="none" lIns="0" tIns="0" rIns="0" bIns="0" rtlCol="0">
+                <a:spAutoFit/>
+              </a:bodyPr>
+              <a:lstStyle/>
+              <a:p>
+                <a:pPr marL="285750" indent="-285750">
+                  <a:buFont typeface="Arial" panose="020B0604020202020204" pitchFamily="34" charset="0"/>
+                  <a:buChar char="•"/>
+                </a:pPr>
+                <a14:m>
+                  <m:oMath xmlns:m="http://schemas.openxmlformats.org/officeDocument/2006/math">
+                    <m:r>
+                      <a:rPr lang="en-GB" b="0" i="1" smtClean="0">
+                        <a:latin typeface="Cambria Math" panose="02040503050406030204" pitchFamily="18" charset="0"/>
+                      </a:rPr>
+                      <m:t>h𝑒𝑟𝑒</m:t>
+                    </m:r>
+                    <m:r>
+                      <a:rPr lang="en-GB" b="0" i="1" smtClean="0">
+                        <a:latin typeface="Cambria Math" panose="02040503050406030204" pitchFamily="18" charset="0"/>
+                      </a:rPr>
+                      <m:t> </m:t>
+                    </m:r>
+                    <m:sSub>
+                      <m:sSubPr>
+                        <m:ctrlPr>
+                          <a:rPr lang="en-GB" b="1" i="1" smtClean="0">
+                            <a:latin typeface="Cambria Math" panose="02040503050406030204" pitchFamily="18" charset="0"/>
+                          </a:rPr>
+                        </m:ctrlPr>
+                      </m:sSubPr>
+                      <m:e>
+                        <m:r>
+                          <a:rPr lang="en-GB" b="1" i="1" smtClean="0">
+                            <a:latin typeface="Cambria Math" panose="02040503050406030204" pitchFamily="18" charset="0"/>
+                          </a:rPr>
+                          <m:t>𝒄</m:t>
+                        </m:r>
+                      </m:e>
+                      <m:sub>
+                        <m:r>
+                          <a:rPr lang="en-GB" b="1" i="1" smtClean="0">
+                            <a:latin typeface="Cambria Math" panose="02040503050406030204" pitchFamily="18" charset="0"/>
+                          </a:rPr>
+                          <m:t>𝒕</m:t>
+                        </m:r>
+                        <m:r>
+                          <a:rPr lang="en-GB" b="1" i="1" smtClean="0">
+                            <a:latin typeface="Cambria Math" panose="02040503050406030204" pitchFamily="18" charset="0"/>
+                          </a:rPr>
+                          <m:t>−</m:t>
+                        </m:r>
+                        <m:r>
+                          <a:rPr lang="en-GB" b="1" i="1" smtClean="0">
+                            <a:latin typeface="Cambria Math" panose="02040503050406030204" pitchFamily="18" charset="0"/>
+                          </a:rPr>
+                          <m:t>𝟏</m:t>
+                        </m:r>
+                      </m:sub>
+                    </m:sSub>
+                    <m:r>
+                      <a:rPr lang="en-GB" b="1" i="1" smtClean="0">
+                        <a:latin typeface="Cambria Math" panose="02040503050406030204" pitchFamily="18" charset="0"/>
+                      </a:rPr>
+                      <m:t> </m:t>
+                    </m:r>
+                    <m:r>
+                      <a:rPr lang="en-GB" b="0" i="1" smtClean="0">
+                        <a:latin typeface="Cambria Math" panose="02040503050406030204" pitchFamily="18" charset="0"/>
+                      </a:rPr>
+                      <m:t>𝑎𝑛𝑑</m:t>
+                    </m:r>
+                    <m:sSub>
+                      <m:sSubPr>
+                        <m:ctrlPr>
+                          <a:rPr lang="en-GB" b="1" i="1">
+                            <a:latin typeface="Cambria Math" panose="02040503050406030204" pitchFamily="18" charset="0"/>
+                          </a:rPr>
+                        </m:ctrlPr>
+                      </m:sSubPr>
+                      <m:e>
+                        <m:r>
+                          <a:rPr lang="en-GB" b="1" i="1" smtClean="0">
+                            <a:latin typeface="Cambria Math" panose="02040503050406030204" pitchFamily="18" charset="0"/>
+                          </a:rPr>
+                          <m:t> </m:t>
+                        </m:r>
+                        <m:r>
+                          <a:rPr lang="en-GB" b="1" i="1" smtClean="0">
+                            <a:latin typeface="Cambria Math" panose="02040503050406030204" pitchFamily="18" charset="0"/>
+                          </a:rPr>
+                          <m:t>𝒉</m:t>
+                        </m:r>
+                      </m:e>
+                      <m:sub>
+                        <m:r>
+                          <a:rPr lang="en-GB" b="1" i="1">
+                            <a:latin typeface="Cambria Math" panose="02040503050406030204" pitchFamily="18" charset="0"/>
+                          </a:rPr>
+                          <m:t>𝒕</m:t>
+                        </m:r>
+                        <m:r>
+                          <a:rPr lang="en-GB" b="1" i="1" smtClean="0">
+                            <a:latin typeface="Cambria Math" panose="02040503050406030204" pitchFamily="18" charset="0"/>
+                          </a:rPr>
+                          <m:t>−</m:t>
+                        </m:r>
+                        <m:r>
+                          <a:rPr lang="en-GB" b="1" i="1" smtClean="0">
+                            <a:latin typeface="Cambria Math" panose="02040503050406030204" pitchFamily="18" charset="0"/>
+                          </a:rPr>
+                          <m:t>𝟏</m:t>
+                        </m:r>
+                      </m:sub>
+                    </m:sSub>
+                    <m:r>
+                      <a:rPr lang="en-GB" b="1" i="1" smtClean="0">
+                        <a:latin typeface="Cambria Math" panose="02040503050406030204" pitchFamily="18" charset="0"/>
+                      </a:rPr>
+                      <m:t> </m:t>
+                    </m:r>
+                    <m:r>
+                      <a:rPr lang="en-GB" b="0" i="1" smtClean="0">
+                        <a:latin typeface="Cambria Math" panose="02040503050406030204" pitchFamily="18" charset="0"/>
+                      </a:rPr>
+                      <m:t>𝑏𝑜𝑡h</m:t>
+                    </m:r>
+                    <m:r>
+                      <a:rPr lang="en-GB" b="0" i="1" smtClean="0">
+                        <a:latin typeface="Cambria Math" panose="02040503050406030204" pitchFamily="18" charset="0"/>
+                      </a:rPr>
+                      <m:t> </m:t>
+                    </m:r>
+                    <m:r>
+                      <a:rPr lang="en-GB" b="0" i="1" smtClean="0">
+                        <a:latin typeface="Cambria Math" panose="02040503050406030204" pitchFamily="18" charset="0"/>
+                      </a:rPr>
+                      <m:t>𝑎𝑟𝑒</m:t>
+                    </m:r>
+                    <m:r>
+                      <a:rPr lang="en-GB" b="0" i="1" smtClean="0">
+                        <a:latin typeface="Cambria Math" panose="02040503050406030204" pitchFamily="18" charset="0"/>
+                      </a:rPr>
+                      <m:t> </m:t>
+                    </m:r>
+                    <m:r>
+                      <a:rPr lang="en-GB" b="0" i="1" smtClean="0">
+                        <a:latin typeface="Cambria Math" panose="02040503050406030204" pitchFamily="18" charset="0"/>
+                      </a:rPr>
+                      <m:t>𝑣𝑒𝑐𝑡𝑜𝑟</m:t>
+                    </m:r>
+                    <m:r>
+                      <a:rPr lang="en-GB" b="0" i="1" smtClean="0">
+                        <a:latin typeface="Cambria Math" panose="02040503050406030204" pitchFamily="18" charset="0"/>
+                      </a:rPr>
+                      <m:t>, </m:t>
+                    </m:r>
+                    <m:r>
+                      <a:rPr lang="en-GB" b="0" i="1" smtClean="0">
+                        <a:latin typeface="Cambria Math" panose="02040503050406030204" pitchFamily="18" charset="0"/>
+                      </a:rPr>
+                      <m:t>𝑎𝑛𝑑</m:t>
+                    </m:r>
+                    <m:r>
+                      <a:rPr lang="en-GB" b="0" i="1" smtClean="0">
+                        <a:latin typeface="Cambria Math" panose="02040503050406030204" pitchFamily="18" charset="0"/>
+                      </a:rPr>
+                      <m:t> </m:t>
+                    </m:r>
+                    <m:r>
+                      <a:rPr lang="en-GB" b="0" i="1" smtClean="0">
+                        <a:latin typeface="Cambria Math" panose="02040503050406030204" pitchFamily="18" charset="0"/>
+                      </a:rPr>
+                      <m:t>𝑡h𝑒𝑦</m:t>
+                    </m:r>
+                    <m:r>
+                      <a:rPr lang="en-GB" b="0" i="1" smtClean="0">
+                        <a:latin typeface="Cambria Math" panose="02040503050406030204" pitchFamily="18" charset="0"/>
+                      </a:rPr>
+                      <m:t> </m:t>
+                    </m:r>
+                    <m:r>
+                      <a:rPr lang="en-GB" b="0" i="1" smtClean="0">
+                        <a:latin typeface="Cambria Math" panose="02040503050406030204" pitchFamily="18" charset="0"/>
+                      </a:rPr>
+                      <m:t>𝑎𝑟𝑒</m:t>
+                    </m:r>
+                  </m:oMath>
+                </a14:m>
+                <a:endParaRPr lang="en-GB" b="0" dirty="0"/>
+              </a:p>
+              <a:p>
+                <a14:m>
+                  <m:oMathPara xmlns:m="http://schemas.openxmlformats.org/officeDocument/2006/math">
+                    <m:oMathParaPr>
+                      <m:jc m:val="centerGroup"/>
+                    </m:oMathParaPr>
+                    <m:oMath xmlns:m="http://schemas.openxmlformats.org/officeDocument/2006/math">
+                      <m:r>
+                        <a:rPr lang="en-GB" b="0" i="1" smtClean="0">
+                          <a:latin typeface="Cambria Math" panose="02040503050406030204" pitchFamily="18" charset="0"/>
+                        </a:rPr>
+                        <m:t>𝑎𝑙𝑤𝑎𝑦𝑠</m:t>
+                      </m:r>
+                      <m:r>
+                        <a:rPr lang="en-GB" b="0" i="1" smtClean="0">
+                          <a:latin typeface="Cambria Math" panose="02040503050406030204" pitchFamily="18" charset="0"/>
+                        </a:rPr>
+                        <m:t> </m:t>
+                      </m:r>
+                      <m:r>
+                        <a:rPr lang="en-GB" b="0" i="1" smtClean="0">
+                          <a:latin typeface="Cambria Math" panose="02040503050406030204" pitchFamily="18" charset="0"/>
+                        </a:rPr>
+                        <m:t>𝑠𝑎𝑚𝑒</m:t>
+                      </m:r>
+                      <m:r>
+                        <a:rPr lang="en-GB" b="0" i="1" smtClean="0">
+                          <a:latin typeface="Cambria Math" panose="02040503050406030204" pitchFamily="18" charset="0"/>
+                        </a:rPr>
+                        <m:t> </m:t>
+                      </m:r>
+                      <m:r>
+                        <a:rPr lang="en-GB" b="0" i="1" smtClean="0">
+                          <a:latin typeface="Cambria Math" panose="02040503050406030204" pitchFamily="18" charset="0"/>
+                        </a:rPr>
+                        <m:t>𝑑𝑖𝑚𝑒𝑛𝑠𝑖𝑜𝑛</m:t>
+                      </m:r>
+                    </m:oMath>
+                  </m:oMathPara>
+                </a14:m>
+                <a:endParaRPr lang="en-GB" dirty="0"/>
+              </a:p>
+            </p:txBody>
+          </p:sp>
+        </mc:Choice>
+        <mc:Fallback>
+          <p:sp>
+            <p:nvSpPr>
+              <p:cNvPr id="3" name="TextBox 2">
+                <a:extLst>
+                  <a:ext uri="{FF2B5EF4-FFF2-40B4-BE49-F238E27FC236}">
+                    <a16:creationId xmlns:a16="http://schemas.microsoft.com/office/drawing/2014/main" id="{99F66C22-92FA-41B4-959D-2B65BE6079EF}"/>
+                  </a:ext>
+                </a:extLst>
+              </p:cNvPr>
+              <p:cNvSpPr txBox="1">
+                <a:spLocks noRot="1" noChangeAspect="1" noMove="1" noResize="1" noEditPoints="1" noAdjustHandles="1" noChangeArrowheads="1" noChangeShapeType="1" noTextEdit="1"/>
+              </p:cNvSpPr>
+              <p:nvPr/>
+            </p:nvSpPr>
+            <p:spPr>
+              <a:xfrm>
+                <a:off x="5700714" y="1371600"/>
+                <a:ext cx="5252464" cy="553998"/>
+              </a:xfrm>
+              <a:prstGeom prst="rect">
+                <a:avLst/>
+              </a:prstGeom>
+              <a:blipFill>
+                <a:blip r:embed="rId3"/>
+                <a:stretch>
+                  <a:fillRect l="-2436" t="-10989" r="-116" b="-16484"/>
+                </a:stretch>
+              </a:blipFill>
+            </p:spPr>
+            <p:txBody>
+              <a:bodyPr/>
+              <a:lstStyle/>
+              <a:p>
+                <a:r>
+                  <a:rPr lang="en-GB">
+                    <a:noFill/>
+                  </a:rPr>
+                  <a:t> </a:t>
+                </a:r>
+              </a:p>
+            </p:txBody>
+          </p:sp>
+        </mc:Fallback>
+      </mc:AlternateContent>
+      <mc:AlternateContent xmlns:mc="http://schemas.openxmlformats.org/markup-compatibility/2006">
+        <mc:Choice xmlns:a14="http://schemas.microsoft.com/office/drawing/2010/main" Requires="a14">
+          <p:sp>
+            <p:nvSpPr>
+              <p:cNvPr id="10" name="TextBox 9">
+                <a:extLst>
+                  <a:ext uri="{FF2B5EF4-FFF2-40B4-BE49-F238E27FC236}">
+                    <a16:creationId xmlns:a16="http://schemas.microsoft.com/office/drawing/2014/main" id="{45FDA1C0-321A-4270-B002-E3FB6C3AA508}"/>
+                  </a:ext>
+                </a:extLst>
+              </p:cNvPr>
+              <p:cNvSpPr txBox="1"/>
+              <p:nvPr/>
+            </p:nvSpPr>
+            <p:spPr>
+              <a:xfrm>
+                <a:off x="5700714" y="2975431"/>
+                <a:ext cx="6071919" cy="553998"/>
+              </a:xfrm>
+              <a:prstGeom prst="rect">
+                <a:avLst/>
+              </a:prstGeom>
+              <a:noFill/>
+            </p:spPr>
+            <p:txBody>
+              <a:bodyPr wrap="none" lIns="0" tIns="0" rIns="0" bIns="0" rtlCol="0">
+                <a:spAutoFit/>
+              </a:bodyPr>
+              <a:lstStyle/>
+              <a:p>
+                <a:pPr marL="285750" indent="-285750" algn="ctr">
+                  <a:buFont typeface="Arial" panose="020B0604020202020204" pitchFamily="34" charset="0"/>
+                  <a:buChar char="•"/>
+                </a:pPr>
+                <a14:m>
+                  <m:oMath xmlns:m="http://schemas.openxmlformats.org/officeDocument/2006/math">
+                    <m:r>
+                      <a:rPr lang="en-GB" b="0" i="1" smtClean="0">
+                        <a:latin typeface="Cambria Math" panose="02040503050406030204" pitchFamily="18" charset="0"/>
+                      </a:rPr>
+                      <m:t>h𝑒𝑟𝑒</m:t>
+                    </m:r>
+                    <m:r>
+                      <a:rPr lang="en-GB" b="0" i="1" smtClean="0">
+                        <a:latin typeface="Cambria Math" panose="02040503050406030204" pitchFamily="18" charset="0"/>
+                      </a:rPr>
+                      <m:t> </m:t>
+                    </m:r>
+                    <m:sSub>
+                      <m:sSubPr>
+                        <m:ctrlPr>
+                          <a:rPr lang="en-GB" b="1" i="1" smtClean="0">
+                            <a:latin typeface="Cambria Math" panose="02040503050406030204" pitchFamily="18" charset="0"/>
+                          </a:rPr>
+                        </m:ctrlPr>
+                      </m:sSubPr>
+                      <m:e>
+                        <m:r>
+                          <a:rPr lang="en-GB" b="1" i="1" smtClean="0">
+                            <a:latin typeface="Cambria Math" panose="02040503050406030204" pitchFamily="18" charset="0"/>
+                          </a:rPr>
+                          <m:t>𝒙</m:t>
+                        </m:r>
+                      </m:e>
+                      <m:sub>
+                        <m:r>
+                          <a:rPr lang="en-GB" b="1" i="1" smtClean="0">
+                            <a:latin typeface="Cambria Math" panose="02040503050406030204" pitchFamily="18" charset="0"/>
+                          </a:rPr>
+                          <m:t>𝒕</m:t>
+                        </m:r>
+                      </m:sub>
+                    </m:sSub>
+                    <m:r>
+                      <a:rPr lang="en-GB" b="1" i="1" smtClean="0">
+                        <a:latin typeface="Cambria Math" panose="02040503050406030204" pitchFamily="18" charset="0"/>
+                      </a:rPr>
+                      <m:t> </m:t>
+                    </m:r>
+                    <m:r>
+                      <a:rPr lang="en-GB" b="0" i="1" smtClean="0">
+                        <a:latin typeface="Cambria Math" panose="02040503050406030204" pitchFamily="18" charset="0"/>
+                      </a:rPr>
+                      <m:t>𝑎𝑙𝑠𝑜</m:t>
+                    </m:r>
+                    <m:r>
+                      <a:rPr lang="en-GB" b="0" i="1" smtClean="0">
+                        <a:latin typeface="Cambria Math" panose="02040503050406030204" pitchFamily="18" charset="0"/>
+                      </a:rPr>
+                      <m:t> </m:t>
+                    </m:r>
+                    <m:r>
+                      <a:rPr lang="en-GB" b="0" i="1" smtClean="0">
+                        <a:latin typeface="Cambria Math" panose="02040503050406030204" pitchFamily="18" charset="0"/>
+                      </a:rPr>
+                      <m:t>𝑎</m:t>
+                    </m:r>
+                    <m:r>
+                      <a:rPr lang="en-GB" b="0" i="1" smtClean="0">
+                        <a:latin typeface="Cambria Math" panose="02040503050406030204" pitchFamily="18" charset="0"/>
+                      </a:rPr>
+                      <m:t> </m:t>
+                    </m:r>
+                    <m:r>
+                      <a:rPr lang="en-GB" b="0" i="1" smtClean="0">
+                        <a:latin typeface="Cambria Math" panose="02040503050406030204" pitchFamily="18" charset="0"/>
+                      </a:rPr>
+                      <m:t>𝑣𝑒𝑐𝑡𝑜𝑟</m:t>
+                    </m:r>
+                    <m:r>
+                      <a:rPr lang="en-GB" b="0" i="1" smtClean="0">
+                        <a:latin typeface="Cambria Math" panose="02040503050406030204" pitchFamily="18" charset="0"/>
+                      </a:rPr>
+                      <m:t>. </m:t>
+                    </m:r>
+                    <m:r>
+                      <a:rPr lang="en-GB" b="0" i="1" smtClean="0">
+                        <a:latin typeface="Cambria Math" panose="02040503050406030204" pitchFamily="18" charset="0"/>
+                      </a:rPr>
+                      <m:t>𝑇h𝑒</m:t>
+                    </m:r>
+                    <m:r>
+                      <a:rPr lang="en-GB" b="0" i="1" smtClean="0">
+                        <a:latin typeface="Cambria Math" panose="02040503050406030204" pitchFamily="18" charset="0"/>
+                      </a:rPr>
+                      <m:t> </m:t>
+                    </m:r>
+                    <m:r>
+                      <a:rPr lang="en-GB" b="0" i="1" smtClean="0">
+                        <a:latin typeface="Cambria Math" panose="02040503050406030204" pitchFamily="18" charset="0"/>
+                      </a:rPr>
+                      <m:t>𝑙𝑒𝑛𝑔h𝑡</m:t>
+                    </m:r>
+                    <m:r>
+                      <a:rPr lang="en-GB" b="0" i="1" smtClean="0">
+                        <a:latin typeface="Cambria Math" panose="02040503050406030204" pitchFamily="18" charset="0"/>
+                      </a:rPr>
+                      <m:t> </m:t>
+                    </m:r>
+                    <m:r>
+                      <a:rPr lang="en-GB" b="0" i="1" smtClean="0">
+                        <a:latin typeface="Cambria Math" panose="02040503050406030204" pitchFamily="18" charset="0"/>
+                      </a:rPr>
+                      <m:t>𝑜𝑓</m:t>
+                    </m:r>
+                    <m:r>
+                      <a:rPr lang="en-GB" b="0" i="1" smtClean="0">
+                        <a:latin typeface="Cambria Math" panose="02040503050406030204" pitchFamily="18" charset="0"/>
+                      </a:rPr>
+                      <m:t> </m:t>
+                    </m:r>
+                    <m:r>
+                      <a:rPr lang="en-GB" b="0" i="1" smtClean="0">
+                        <a:latin typeface="Cambria Math" panose="02040503050406030204" pitchFamily="18" charset="0"/>
+                      </a:rPr>
+                      <m:t>𝑡h𝑒</m:t>
+                    </m:r>
+                    <m:sSub>
+                      <m:sSubPr>
+                        <m:ctrlPr>
+                          <a:rPr lang="en-GB" b="1" i="1">
+                            <a:latin typeface="Cambria Math" panose="02040503050406030204" pitchFamily="18" charset="0"/>
+                          </a:rPr>
+                        </m:ctrlPr>
+                      </m:sSubPr>
+                      <m:e>
+                        <m:r>
+                          <a:rPr lang="en-GB" b="1" i="1" smtClean="0">
+                            <a:latin typeface="Cambria Math" panose="02040503050406030204" pitchFamily="18" charset="0"/>
+                          </a:rPr>
+                          <m:t> </m:t>
+                        </m:r>
+                        <m:r>
+                          <a:rPr lang="en-GB" b="1" i="1">
+                            <a:latin typeface="Cambria Math" panose="02040503050406030204" pitchFamily="18" charset="0"/>
+                          </a:rPr>
+                          <m:t>𝒙</m:t>
+                        </m:r>
+                      </m:e>
+                      <m:sub>
+                        <m:r>
+                          <a:rPr lang="en-GB" b="1" i="1">
+                            <a:latin typeface="Cambria Math" panose="02040503050406030204" pitchFamily="18" charset="0"/>
+                          </a:rPr>
+                          <m:t>𝒕</m:t>
+                        </m:r>
+                      </m:sub>
+                    </m:sSub>
+                    <m:r>
+                      <a:rPr lang="en-GB" b="1" i="1" smtClean="0">
+                        <a:latin typeface="Cambria Math" panose="02040503050406030204" pitchFamily="18" charset="0"/>
+                      </a:rPr>
+                      <m:t> </m:t>
+                    </m:r>
+                    <m:r>
+                      <a:rPr lang="en-GB" b="0" i="1" smtClean="0">
+                        <a:latin typeface="Cambria Math" panose="02040503050406030204" pitchFamily="18" charset="0"/>
+                      </a:rPr>
+                      <m:t>𝑤𝑖𝑙𝑙</m:t>
+                    </m:r>
+                    <m:r>
+                      <a:rPr lang="en-GB" b="0" i="1" smtClean="0">
+                        <a:latin typeface="Cambria Math" panose="02040503050406030204" pitchFamily="18" charset="0"/>
+                      </a:rPr>
+                      <m:t> </m:t>
+                    </m:r>
+                    <m:r>
+                      <a:rPr lang="en-GB" b="0" i="1" smtClean="0">
+                        <a:latin typeface="Cambria Math" panose="02040503050406030204" pitchFamily="18" charset="0"/>
+                      </a:rPr>
+                      <m:t>𝑏𝑒</m:t>
+                    </m:r>
+                    <m:r>
+                      <a:rPr lang="en-GB" b="0" i="1" smtClean="0">
+                        <a:latin typeface="Cambria Math" panose="02040503050406030204" pitchFamily="18" charset="0"/>
+                      </a:rPr>
+                      <m:t> </m:t>
+                    </m:r>
+                    <m:r>
+                      <a:rPr lang="en-GB" b="0" i="1" smtClean="0">
+                        <a:latin typeface="Cambria Math" panose="02040503050406030204" pitchFamily="18" charset="0"/>
+                      </a:rPr>
+                      <m:t>𝑑𝑖𝑓𝑓𝑒𝑟</m:t>
+                    </m:r>
+                  </m:oMath>
+                </a14:m>
+                <a:endParaRPr lang="en-GB" b="0" dirty="0"/>
+              </a:p>
+              <a:p>
+                <a:pPr algn="ctr"/>
+                <a14:m>
+                  <m:oMathPara xmlns:m="http://schemas.openxmlformats.org/officeDocument/2006/math">
+                    <m:oMathParaPr>
+                      <m:jc m:val="centerGroup"/>
+                    </m:oMathParaPr>
+                    <m:oMath xmlns:m="http://schemas.openxmlformats.org/officeDocument/2006/math">
+                      <m:r>
+                        <a:rPr lang="en-GB" b="0" i="1" smtClean="0">
+                          <a:latin typeface="Cambria Math" panose="02040503050406030204" pitchFamily="18" charset="0"/>
+                        </a:rPr>
+                        <m:t>𝑏𝑎𝑠𝑒𝑑</m:t>
+                      </m:r>
+                      <m:r>
+                        <a:rPr lang="en-GB" b="0" i="1" smtClean="0">
+                          <a:latin typeface="Cambria Math" panose="02040503050406030204" pitchFamily="18" charset="0"/>
+                        </a:rPr>
+                        <m:t> </m:t>
+                      </m:r>
+                      <m:r>
+                        <a:rPr lang="en-GB" b="0" i="1" smtClean="0">
+                          <a:latin typeface="Cambria Math" panose="02040503050406030204" pitchFamily="18" charset="0"/>
+                        </a:rPr>
+                        <m:t>𝑜𝑛</m:t>
+                      </m:r>
+                      <m:r>
+                        <a:rPr lang="en-GB" b="0" i="1" smtClean="0">
+                          <a:latin typeface="Cambria Math" panose="02040503050406030204" pitchFamily="18" charset="0"/>
+                        </a:rPr>
+                        <m:t> </m:t>
+                      </m:r>
+                      <m:r>
+                        <a:rPr lang="en-GB" b="0" i="1" smtClean="0">
+                          <a:latin typeface="Cambria Math" panose="02040503050406030204" pitchFamily="18" charset="0"/>
+                        </a:rPr>
+                        <m:t>𝑡h𝑒</m:t>
+                      </m:r>
+                      <m:r>
+                        <a:rPr lang="en-GB" b="0" i="1" smtClean="0">
+                          <a:latin typeface="Cambria Math" panose="02040503050406030204" pitchFamily="18" charset="0"/>
+                        </a:rPr>
+                        <m:t> </m:t>
+                      </m:r>
+                      <m:r>
+                        <a:rPr lang="en-GB" b="0" i="1" smtClean="0">
+                          <a:latin typeface="Cambria Math" panose="02040503050406030204" pitchFamily="18" charset="0"/>
+                        </a:rPr>
+                        <m:t>𝑠𝑒𝑛𝑡𝑒𝑛𝑐𝑒</m:t>
+                      </m:r>
+                      <m:r>
+                        <a:rPr lang="en-GB" b="0" i="1" smtClean="0">
+                          <a:latin typeface="Cambria Math" panose="02040503050406030204" pitchFamily="18" charset="0"/>
+                        </a:rPr>
+                        <m:t> </m:t>
+                      </m:r>
+                      <m:r>
+                        <a:rPr lang="en-GB" b="0" i="1" smtClean="0">
+                          <a:latin typeface="Cambria Math" panose="02040503050406030204" pitchFamily="18" charset="0"/>
+                        </a:rPr>
+                        <m:t>𝑙𝑒𝑛𝑔𝑡h</m:t>
+                      </m:r>
+                      <m:r>
+                        <a:rPr lang="en-GB" b="0" i="1" smtClean="0">
+                          <a:latin typeface="Cambria Math" panose="02040503050406030204" pitchFamily="18" charset="0"/>
+                        </a:rPr>
+                        <m:t>.</m:t>
+                      </m:r>
+                    </m:oMath>
+                  </m:oMathPara>
+                </a14:m>
+                <a:endParaRPr lang="en-GB" b="0" dirty="0"/>
+              </a:p>
+            </p:txBody>
+          </p:sp>
+        </mc:Choice>
+        <mc:Fallback>
+          <p:sp>
+            <p:nvSpPr>
+              <p:cNvPr id="10" name="TextBox 9">
+                <a:extLst>
+                  <a:ext uri="{FF2B5EF4-FFF2-40B4-BE49-F238E27FC236}">
+                    <a16:creationId xmlns:a16="http://schemas.microsoft.com/office/drawing/2014/main" id="{45FDA1C0-321A-4270-B002-E3FB6C3AA508}"/>
+                  </a:ext>
+                </a:extLst>
+              </p:cNvPr>
+              <p:cNvSpPr txBox="1">
+                <a:spLocks noRot="1" noChangeAspect="1" noMove="1" noResize="1" noEditPoints="1" noAdjustHandles="1" noChangeArrowheads="1" noChangeShapeType="1" noTextEdit="1"/>
+              </p:cNvSpPr>
+              <p:nvPr/>
+            </p:nvSpPr>
+            <p:spPr>
+              <a:xfrm>
+                <a:off x="5700714" y="2975431"/>
+                <a:ext cx="6071919" cy="553998"/>
+              </a:xfrm>
+              <a:prstGeom prst="rect">
+                <a:avLst/>
+              </a:prstGeom>
+              <a:blipFill>
+                <a:blip r:embed="rId4"/>
+                <a:stretch>
+                  <a:fillRect l="-1707" t="-10989" r="-1305" b="-16484"/>
+                </a:stretch>
+              </a:blipFill>
+            </p:spPr>
+            <p:txBody>
+              <a:bodyPr/>
+              <a:lstStyle/>
+              <a:p>
+                <a:r>
+                  <a:rPr lang="en-GB">
+                    <a:noFill/>
+                  </a:rPr>
+                  <a:t> </a:t>
+                </a:r>
+              </a:p>
+            </p:txBody>
+          </p:sp>
+        </mc:Fallback>
+      </mc:AlternateContent>
+      <mc:AlternateContent xmlns:mc="http://schemas.openxmlformats.org/markup-compatibility/2006">
+        <mc:Choice xmlns:a14="http://schemas.microsoft.com/office/drawing/2010/main" Requires="a14">
+          <p:sp>
+            <p:nvSpPr>
+              <p:cNvPr id="13" name="TextBox 12">
+                <a:extLst>
+                  <a:ext uri="{FF2B5EF4-FFF2-40B4-BE49-F238E27FC236}">
+                    <a16:creationId xmlns:a16="http://schemas.microsoft.com/office/drawing/2014/main" id="{BDCF8A24-DD84-497D-BA2F-03D756A84E22}"/>
+                  </a:ext>
+                </a:extLst>
+              </p:cNvPr>
+              <p:cNvSpPr txBox="1"/>
+              <p:nvPr/>
+            </p:nvSpPr>
+            <p:spPr>
+              <a:xfrm>
+                <a:off x="5700714" y="4626285"/>
+                <a:ext cx="4995791" cy="553998"/>
+              </a:xfrm>
+              <a:prstGeom prst="rect">
+                <a:avLst/>
+              </a:prstGeom>
+              <a:noFill/>
+            </p:spPr>
+            <p:txBody>
+              <a:bodyPr wrap="none" lIns="0" tIns="0" rIns="0" bIns="0" rtlCol="0">
+                <a:spAutoFit/>
+              </a:bodyPr>
+              <a:lstStyle/>
+              <a:p>
+                <a:pPr marL="285750" indent="-285750">
+                  <a:buFont typeface="Arial" panose="020B0604020202020204" pitchFamily="34" charset="0"/>
+                  <a:buChar char="•"/>
+                </a:pPr>
+                <a14:m>
+                  <m:oMath xmlns:m="http://schemas.openxmlformats.org/officeDocument/2006/math">
+                    <m:r>
+                      <a:rPr lang="en-GB" b="0" i="1" smtClean="0">
+                        <a:latin typeface="Cambria Math" panose="02040503050406030204" pitchFamily="18" charset="0"/>
+                      </a:rPr>
+                      <m:t>h𝑒𝑟𝑒</m:t>
+                    </m:r>
+                    <m:r>
+                      <a:rPr lang="en-GB" b="0" i="1" smtClean="0">
+                        <a:latin typeface="Cambria Math" panose="02040503050406030204" pitchFamily="18" charset="0"/>
+                      </a:rPr>
+                      <m:t> </m:t>
+                    </m:r>
+                    <m:sSub>
+                      <m:sSubPr>
+                        <m:ctrlPr>
+                          <a:rPr lang="en-GB" b="1" i="1" smtClean="0">
+                            <a:latin typeface="Cambria Math" panose="02040503050406030204" pitchFamily="18" charset="0"/>
+                          </a:rPr>
+                        </m:ctrlPr>
+                      </m:sSubPr>
+                      <m:e>
+                        <m:r>
+                          <a:rPr lang="en-GB" b="1" i="1" smtClean="0">
+                            <a:latin typeface="Cambria Math" panose="02040503050406030204" pitchFamily="18" charset="0"/>
+                          </a:rPr>
+                          <m:t>𝒇</m:t>
+                        </m:r>
+                      </m:e>
+                      <m:sub>
+                        <m:r>
+                          <a:rPr lang="en-GB" b="1" i="1" smtClean="0">
+                            <a:latin typeface="Cambria Math" panose="02040503050406030204" pitchFamily="18" charset="0"/>
+                          </a:rPr>
+                          <m:t>𝒕</m:t>
+                        </m:r>
+                      </m:sub>
+                    </m:sSub>
+                    <m:r>
+                      <a:rPr lang="en-GB" b="1" i="1" smtClean="0">
+                        <a:latin typeface="Cambria Math" panose="02040503050406030204" pitchFamily="18" charset="0"/>
+                      </a:rPr>
+                      <m:t>,</m:t>
+                    </m:r>
+                    <m:sSub>
+                      <m:sSubPr>
+                        <m:ctrlPr>
+                          <a:rPr lang="en-GB" b="1" i="1">
+                            <a:latin typeface="Cambria Math" panose="02040503050406030204" pitchFamily="18" charset="0"/>
+                          </a:rPr>
+                        </m:ctrlPr>
+                      </m:sSubPr>
+                      <m:e>
+                        <m:r>
+                          <a:rPr lang="en-GB" b="1" i="1" smtClean="0">
+                            <a:latin typeface="Cambria Math" panose="02040503050406030204" pitchFamily="18" charset="0"/>
+                          </a:rPr>
+                          <m:t> </m:t>
+                        </m:r>
+                        <m:r>
+                          <a:rPr lang="en-GB" b="1" i="1" smtClean="0">
+                            <a:latin typeface="Cambria Math" panose="02040503050406030204" pitchFamily="18" charset="0"/>
+                          </a:rPr>
+                          <m:t>𝒊</m:t>
+                        </m:r>
+                      </m:e>
+                      <m:sub>
+                        <m:r>
+                          <a:rPr lang="en-GB" b="1" i="1">
+                            <a:latin typeface="Cambria Math" panose="02040503050406030204" pitchFamily="18" charset="0"/>
+                          </a:rPr>
+                          <m:t>𝒕</m:t>
+                        </m:r>
+                      </m:sub>
+                    </m:sSub>
+                    <m:r>
+                      <a:rPr lang="en-GB" b="1" i="1" smtClean="0">
+                        <a:latin typeface="Cambria Math" panose="02040503050406030204" pitchFamily="18" charset="0"/>
+                      </a:rPr>
+                      <m:t>, </m:t>
+                    </m:r>
+                    <m:acc>
+                      <m:accPr>
+                        <m:chr m:val="̅"/>
+                        <m:ctrlPr>
+                          <a:rPr lang="en-GB" b="1" i="1" smtClean="0">
+                            <a:latin typeface="Cambria Math" panose="02040503050406030204" pitchFamily="18" charset="0"/>
+                          </a:rPr>
+                        </m:ctrlPr>
+                      </m:accPr>
+                      <m:e>
+                        <m:sSub>
+                          <m:sSubPr>
+                            <m:ctrlPr>
+                              <a:rPr lang="en-GB" b="1" i="1" smtClean="0">
+                                <a:latin typeface="Cambria Math" panose="02040503050406030204" pitchFamily="18" charset="0"/>
+                              </a:rPr>
+                            </m:ctrlPr>
+                          </m:sSubPr>
+                          <m:e>
+                            <m:r>
+                              <a:rPr lang="en-GB" b="1" i="1" smtClean="0">
+                                <a:latin typeface="Cambria Math" panose="02040503050406030204" pitchFamily="18" charset="0"/>
+                              </a:rPr>
+                              <m:t>𝒄</m:t>
+                            </m:r>
+                          </m:e>
+                          <m:sub>
+                            <m:r>
+                              <a:rPr lang="en-GB" b="1" i="1" smtClean="0">
+                                <a:latin typeface="Cambria Math" panose="02040503050406030204" pitchFamily="18" charset="0"/>
+                              </a:rPr>
+                              <m:t>𝒕</m:t>
+                            </m:r>
+                          </m:sub>
+                        </m:sSub>
+                      </m:e>
+                    </m:acc>
+                    <m:r>
+                      <a:rPr lang="en-GB" b="1" i="1" smtClean="0">
+                        <a:latin typeface="Cambria Math" panose="02040503050406030204" pitchFamily="18" charset="0"/>
+                      </a:rPr>
+                      <m:t> ,</m:t>
+                    </m:r>
+                    <m:r>
+                      <a:rPr lang="en-GB" b="0" i="1" smtClean="0">
+                        <a:latin typeface="Cambria Math" panose="02040503050406030204" pitchFamily="18" charset="0"/>
+                      </a:rPr>
+                      <m:t>𝑎𝑛𝑑</m:t>
+                    </m:r>
+                    <m:r>
+                      <a:rPr lang="en-GB" b="1" i="1" smtClean="0">
+                        <a:latin typeface="Cambria Math" panose="02040503050406030204" pitchFamily="18" charset="0"/>
+                      </a:rPr>
+                      <m:t> </m:t>
+                    </m:r>
+                    <m:sSub>
+                      <m:sSubPr>
+                        <m:ctrlPr>
+                          <a:rPr lang="en-GB" b="1" i="1">
+                            <a:latin typeface="Cambria Math" panose="02040503050406030204" pitchFamily="18" charset="0"/>
+                          </a:rPr>
+                        </m:ctrlPr>
+                      </m:sSubPr>
+                      <m:e>
+                        <m:r>
+                          <a:rPr lang="en-GB" b="1" i="1" smtClean="0">
+                            <a:latin typeface="Cambria Math" panose="02040503050406030204" pitchFamily="18" charset="0"/>
+                          </a:rPr>
+                          <m:t>𝒐</m:t>
+                        </m:r>
+                      </m:e>
+                      <m:sub>
+                        <m:r>
+                          <a:rPr lang="en-GB" b="1" i="1">
+                            <a:latin typeface="Cambria Math" panose="02040503050406030204" pitchFamily="18" charset="0"/>
+                          </a:rPr>
+                          <m:t>𝒕</m:t>
+                        </m:r>
+                      </m:sub>
+                    </m:sSub>
+                    <m:r>
+                      <a:rPr lang="en-GB" b="1" i="1" smtClean="0">
+                        <a:latin typeface="Cambria Math" panose="02040503050406030204" pitchFamily="18" charset="0"/>
+                      </a:rPr>
+                      <m:t> </m:t>
+                    </m:r>
+                    <m:r>
+                      <a:rPr lang="en-GB" b="0" i="1" smtClean="0">
+                        <a:latin typeface="Cambria Math" panose="02040503050406030204" pitchFamily="18" charset="0"/>
+                      </a:rPr>
+                      <m:t>𝑎𝑟𝑒</m:t>
+                    </m:r>
+                    <m:r>
+                      <a:rPr lang="en-GB" b="0" i="1" smtClean="0">
+                        <a:latin typeface="Cambria Math" panose="02040503050406030204" pitchFamily="18" charset="0"/>
+                      </a:rPr>
+                      <m:t> </m:t>
+                    </m:r>
+                    <m:r>
+                      <a:rPr lang="en-GB" b="0" i="1" smtClean="0">
+                        <a:latin typeface="Cambria Math" panose="02040503050406030204" pitchFamily="18" charset="0"/>
+                      </a:rPr>
+                      <m:t>𝑣𝑒𝑐𝑡𝑜𝑟</m:t>
+                    </m:r>
+                    <m:r>
+                      <a:rPr lang="en-GB" b="0" i="1" smtClean="0">
+                        <a:latin typeface="Cambria Math" panose="02040503050406030204" pitchFamily="18" charset="0"/>
+                      </a:rPr>
+                      <m:t>, </m:t>
+                    </m:r>
+                    <m:r>
+                      <a:rPr lang="en-GB" b="0" i="1" smtClean="0">
+                        <a:latin typeface="Cambria Math" panose="02040503050406030204" pitchFamily="18" charset="0"/>
+                      </a:rPr>
+                      <m:t>𝑎𝑛𝑑</m:t>
+                    </m:r>
+                    <m:r>
+                      <a:rPr lang="en-GB" b="0" i="1" smtClean="0">
+                        <a:latin typeface="Cambria Math" panose="02040503050406030204" pitchFamily="18" charset="0"/>
+                      </a:rPr>
+                      <m:t> </m:t>
+                    </m:r>
+                    <m:r>
+                      <a:rPr lang="en-GB" b="0" i="1" smtClean="0">
+                        <a:latin typeface="Cambria Math" panose="02040503050406030204" pitchFamily="18" charset="0"/>
+                      </a:rPr>
+                      <m:t>𝑡h𝑒𝑦</m:t>
+                    </m:r>
+                    <m:r>
+                      <a:rPr lang="en-GB" b="0" i="1" smtClean="0">
+                        <a:latin typeface="Cambria Math" panose="02040503050406030204" pitchFamily="18" charset="0"/>
+                      </a:rPr>
+                      <m:t> </m:t>
+                    </m:r>
+                    <m:r>
+                      <a:rPr lang="en-GB" b="0" i="1" smtClean="0">
+                        <a:latin typeface="Cambria Math" panose="02040503050406030204" pitchFamily="18" charset="0"/>
+                      </a:rPr>
+                      <m:t>𝑎𝑟𝑒</m:t>
+                    </m:r>
+                  </m:oMath>
+                </a14:m>
+                <a:endParaRPr lang="en-GB" b="0" dirty="0"/>
+              </a:p>
+              <a:p>
+                <a14:m>
+                  <m:oMathPara xmlns:m="http://schemas.openxmlformats.org/officeDocument/2006/math">
+                    <m:oMathParaPr>
+                      <m:jc m:val="centerGroup"/>
+                    </m:oMathParaPr>
+                    <m:oMath xmlns:m="http://schemas.openxmlformats.org/officeDocument/2006/math">
+                      <m:r>
+                        <a:rPr lang="en-GB" b="0" i="1" smtClean="0">
+                          <a:latin typeface="Cambria Math" panose="02040503050406030204" pitchFamily="18" charset="0"/>
+                        </a:rPr>
+                        <m:t>𝑎𝑙𝑤𝑎𝑦𝑠</m:t>
+                      </m:r>
+                      <m:r>
+                        <a:rPr lang="en-GB" b="0" i="1" smtClean="0">
+                          <a:latin typeface="Cambria Math" panose="02040503050406030204" pitchFamily="18" charset="0"/>
+                        </a:rPr>
+                        <m:t> </m:t>
+                      </m:r>
+                      <m:r>
+                        <a:rPr lang="en-GB" b="0" i="1" smtClean="0">
+                          <a:latin typeface="Cambria Math" panose="02040503050406030204" pitchFamily="18" charset="0"/>
+                        </a:rPr>
+                        <m:t>𝑠𝑎𝑚𝑒</m:t>
+                      </m:r>
+                      <m:r>
+                        <a:rPr lang="en-GB" b="0" i="1" smtClean="0">
+                          <a:latin typeface="Cambria Math" panose="02040503050406030204" pitchFamily="18" charset="0"/>
+                        </a:rPr>
+                        <m:t> </m:t>
+                      </m:r>
+                      <m:r>
+                        <a:rPr lang="en-GB" b="0" i="1" smtClean="0">
+                          <a:latin typeface="Cambria Math" panose="02040503050406030204" pitchFamily="18" charset="0"/>
+                        </a:rPr>
+                        <m:t>𝑑𝑖𝑚𝑒𝑛𝑠𝑖𝑜𝑛</m:t>
+                      </m:r>
+                    </m:oMath>
+                  </m:oMathPara>
+                </a14:m>
+                <a:endParaRPr lang="en-GB" dirty="0"/>
+              </a:p>
+            </p:txBody>
+          </p:sp>
+        </mc:Choice>
+        <mc:Fallback>
+          <p:sp>
+            <p:nvSpPr>
+              <p:cNvPr id="13" name="TextBox 12">
+                <a:extLst>
+                  <a:ext uri="{FF2B5EF4-FFF2-40B4-BE49-F238E27FC236}">
+                    <a16:creationId xmlns:a16="http://schemas.microsoft.com/office/drawing/2014/main" id="{BDCF8A24-DD84-497D-BA2F-03D756A84E22}"/>
+                  </a:ext>
+                </a:extLst>
+              </p:cNvPr>
+              <p:cNvSpPr txBox="1">
+                <a:spLocks noRot="1" noChangeAspect="1" noMove="1" noResize="1" noEditPoints="1" noAdjustHandles="1" noChangeArrowheads="1" noChangeShapeType="1" noTextEdit="1"/>
+              </p:cNvSpPr>
+              <p:nvPr/>
+            </p:nvSpPr>
+            <p:spPr>
+              <a:xfrm>
+                <a:off x="5700714" y="4626285"/>
+                <a:ext cx="4995791" cy="553998"/>
+              </a:xfrm>
+              <a:prstGeom prst="rect">
+                <a:avLst/>
+              </a:prstGeom>
+              <a:blipFill>
+                <a:blip r:embed="rId5"/>
+                <a:stretch>
+                  <a:fillRect l="-2561" t="-10989" b="-16484"/>
+                </a:stretch>
+              </a:blipFill>
+            </p:spPr>
+            <p:txBody>
+              <a:bodyPr/>
+              <a:lstStyle/>
+              <a:p>
+                <a:r>
+                  <a:rPr lang="en-GB">
+                    <a:noFill/>
+                  </a:rPr>
+                  <a:t> </a:t>
+                </a:r>
+              </a:p>
+            </p:txBody>
+          </p:sp>
+        </mc:Fallback>
+      </mc:AlternateContent>
+      <p:sp>
+        <p:nvSpPr>
+          <p:cNvPr id="4" name="TextBox 3">
+            <a:extLst>
+              <a:ext uri="{FF2B5EF4-FFF2-40B4-BE49-F238E27FC236}">
+                <a16:creationId xmlns:a16="http://schemas.microsoft.com/office/drawing/2014/main" id="{01301E3D-C95B-4A6F-870B-9BAD4CA6E8E6}"/>
+              </a:ext>
+            </a:extLst>
+          </p:cNvPr>
+          <p:cNvSpPr txBox="1"/>
+          <p:nvPr/>
+        </p:nvSpPr>
+        <p:spPr>
+          <a:xfrm>
+            <a:off x="5560112" y="2127349"/>
+            <a:ext cx="5661486" cy="646331"/>
+          </a:xfrm>
+          <a:prstGeom prst="rect">
+            <a:avLst/>
+          </a:prstGeom>
+          <a:noFill/>
+        </p:spPr>
+        <p:txBody>
+          <a:bodyPr wrap="none" rtlCol="0">
+            <a:spAutoFit/>
+          </a:bodyPr>
+          <a:lstStyle/>
+          <a:p>
+            <a:pPr marL="285750" indent="-285750" algn="ctr">
+              <a:buFont typeface="Arial" panose="020B0604020202020204" pitchFamily="34" charset="0"/>
+              <a:buChar char="•"/>
+            </a:pPr>
+            <a:r>
+              <a:rPr lang="en-GB" i="1" dirty="0"/>
+              <a:t>The dimension or shape of </a:t>
+            </a:r>
+            <a:r>
+              <a:rPr lang="en-GB" b="1" i="1" dirty="0"/>
+              <a:t>c</a:t>
+            </a:r>
+            <a:r>
+              <a:rPr lang="en-GB" b="1" i="1" baseline="-25000" dirty="0"/>
+              <a:t>t-1</a:t>
+            </a:r>
+            <a:r>
+              <a:rPr lang="en-GB" i="1" dirty="0"/>
+              <a:t> and </a:t>
+            </a:r>
+            <a:r>
+              <a:rPr lang="en-GB" b="1" i="1" dirty="0"/>
+              <a:t>h</a:t>
+            </a:r>
+            <a:r>
+              <a:rPr lang="en-GB" b="1" i="1" baseline="-25000" dirty="0"/>
+              <a:t>t-1</a:t>
+            </a:r>
+            <a:r>
+              <a:rPr lang="en-GB" i="1" dirty="0"/>
+              <a:t>  same as number</a:t>
+            </a:r>
+          </a:p>
+          <a:p>
+            <a:pPr algn="ctr"/>
+            <a:r>
+              <a:rPr lang="en-GB" i="1" dirty="0"/>
+              <a:t>Of neural network nodes or units.</a:t>
+            </a:r>
+          </a:p>
+        </p:txBody>
+      </p:sp>
+      <p:sp>
+        <p:nvSpPr>
+          <p:cNvPr id="6" name="TextBox 5">
+            <a:extLst>
+              <a:ext uri="{FF2B5EF4-FFF2-40B4-BE49-F238E27FC236}">
+                <a16:creationId xmlns:a16="http://schemas.microsoft.com/office/drawing/2014/main" id="{3CD85C00-0F5E-4B93-9443-A7BEBAA7DE91}"/>
+              </a:ext>
+            </a:extLst>
+          </p:cNvPr>
+          <p:cNvSpPr txBox="1"/>
+          <p:nvPr/>
+        </p:nvSpPr>
+        <p:spPr>
+          <a:xfrm>
+            <a:off x="5295617" y="3639620"/>
+            <a:ext cx="6518387" cy="1200329"/>
+          </a:xfrm>
+          <a:prstGeom prst="rect">
+            <a:avLst/>
+          </a:prstGeom>
+          <a:noFill/>
+        </p:spPr>
+        <p:txBody>
+          <a:bodyPr wrap="none" rtlCol="0">
+            <a:spAutoFit/>
+          </a:bodyPr>
+          <a:lstStyle/>
+          <a:p>
+            <a:pPr marL="285750" indent="-285750" algn="ctr">
+              <a:buFont typeface="Arial" panose="020B0604020202020204" pitchFamily="34" charset="0"/>
+              <a:buChar char="•"/>
+            </a:pPr>
+            <a:r>
+              <a:rPr lang="en-GB" b="0" i="1" dirty="0"/>
+              <a:t>Timestamp will be the max length of the sentence. If in our</a:t>
+            </a:r>
+          </a:p>
+          <a:p>
+            <a:pPr algn="ctr"/>
+            <a:r>
+              <a:rPr lang="en-GB" i="1" dirty="0"/>
+              <a:t>           Document the max length of a sentence is 50 then time-stamp</a:t>
+            </a:r>
+          </a:p>
+          <a:p>
+            <a:pPr algn="ctr"/>
+            <a:r>
+              <a:rPr lang="en-GB" b="0" i="1" dirty="0"/>
+              <a:t>Will be </a:t>
+            </a:r>
+            <a:r>
+              <a:rPr lang="en-GB" b="1" i="1" dirty="0"/>
+              <a:t>t</a:t>
+            </a:r>
+            <a:r>
+              <a:rPr lang="en-GB" b="1" i="1" baseline="-25000" dirty="0"/>
+              <a:t>1</a:t>
+            </a:r>
+            <a:r>
+              <a:rPr lang="en-GB" b="0" i="1" baseline="-25000" dirty="0"/>
+              <a:t> </a:t>
+            </a:r>
+            <a:r>
+              <a:rPr lang="en-GB" b="0" i="1" dirty="0"/>
+              <a:t>to </a:t>
+            </a:r>
+            <a:r>
+              <a:rPr lang="en-GB" b="1" i="1" dirty="0"/>
+              <a:t>t</a:t>
+            </a:r>
+            <a:r>
+              <a:rPr lang="en-GB" b="1" i="1" baseline="-25000" dirty="0"/>
+              <a:t>50</a:t>
+            </a:r>
+            <a:endParaRPr lang="en-GB" b="1" i="1" dirty="0"/>
+          </a:p>
+          <a:p>
+            <a:endParaRPr lang="en-GB" dirty="0"/>
+          </a:p>
+        </p:txBody>
+      </p:sp>
+      <p:sp>
+        <p:nvSpPr>
+          <p:cNvPr id="7" name="Oval 6">
+            <a:extLst>
+              <a:ext uri="{FF2B5EF4-FFF2-40B4-BE49-F238E27FC236}">
+                <a16:creationId xmlns:a16="http://schemas.microsoft.com/office/drawing/2014/main" id="{6FE19C34-0940-4B4A-99EB-4AB63ED1F4DC}"/>
+              </a:ext>
+            </a:extLst>
+          </p:cNvPr>
+          <p:cNvSpPr/>
+          <p:nvPr/>
+        </p:nvSpPr>
+        <p:spPr>
+          <a:xfrm>
+            <a:off x="753013" y="4626285"/>
+            <a:ext cx="123824" cy="185738"/>
+          </a:xfrm>
+          <a:prstGeom prst="ellipse">
+            <a:avLst/>
+          </a:prstGeom>
+        </p:spPr>
+        <p:style>
+          <a:lnRef idx="2">
+            <a:schemeClr val="accent1">
+              <a:shade val="50000"/>
+            </a:schemeClr>
+          </a:lnRef>
+          <a:fillRef idx="1">
+            <a:schemeClr val="accent1"/>
+          </a:fillRef>
+          <a:effectRef idx="0">
+            <a:schemeClr val="accent1"/>
+          </a:effectRef>
+          <a:fontRef idx="minor">
+            <a:schemeClr val="lt1"/>
+          </a:fontRef>
+        </p:style>
+        <p:txBody>
+          <a:bodyPr rtlCol="0" anchor="ctr"/>
+          <a:lstStyle/>
+          <a:p>
+            <a:pPr algn="ctr"/>
+            <a:endParaRPr lang="en-GB"/>
+          </a:p>
+        </p:txBody>
+      </p:sp>
+      <p:sp>
+        <p:nvSpPr>
+          <p:cNvPr id="15" name="Oval 14">
+            <a:extLst>
+              <a:ext uri="{FF2B5EF4-FFF2-40B4-BE49-F238E27FC236}">
+                <a16:creationId xmlns:a16="http://schemas.microsoft.com/office/drawing/2014/main" id="{11A77BE2-CBCB-4E6E-8A21-CEBC3A07CF2D}"/>
+              </a:ext>
+            </a:extLst>
+          </p:cNvPr>
+          <p:cNvSpPr/>
+          <p:nvPr/>
+        </p:nvSpPr>
+        <p:spPr>
+          <a:xfrm>
+            <a:off x="753013" y="4844525"/>
+            <a:ext cx="123824" cy="185738"/>
+          </a:xfrm>
+          <a:prstGeom prst="ellipse">
+            <a:avLst/>
+          </a:prstGeom>
+        </p:spPr>
+        <p:style>
+          <a:lnRef idx="2">
+            <a:schemeClr val="accent1">
+              <a:shade val="50000"/>
+            </a:schemeClr>
+          </a:lnRef>
+          <a:fillRef idx="1">
+            <a:schemeClr val="accent1"/>
+          </a:fillRef>
+          <a:effectRef idx="0">
+            <a:schemeClr val="accent1"/>
+          </a:effectRef>
+          <a:fontRef idx="minor">
+            <a:schemeClr val="lt1"/>
+          </a:fontRef>
+        </p:style>
+        <p:txBody>
+          <a:bodyPr rtlCol="0" anchor="ctr"/>
+          <a:lstStyle/>
+          <a:p>
+            <a:pPr algn="ctr"/>
+            <a:endParaRPr lang="en-GB"/>
+          </a:p>
+        </p:txBody>
+      </p:sp>
+      <p:sp>
+        <p:nvSpPr>
+          <p:cNvPr id="16" name="Oval 15">
+            <a:extLst>
+              <a:ext uri="{FF2B5EF4-FFF2-40B4-BE49-F238E27FC236}">
+                <a16:creationId xmlns:a16="http://schemas.microsoft.com/office/drawing/2014/main" id="{2A3DA037-8CAF-4C1F-9237-355787525914}"/>
+              </a:ext>
+            </a:extLst>
+          </p:cNvPr>
+          <p:cNvSpPr/>
+          <p:nvPr/>
+        </p:nvSpPr>
+        <p:spPr>
+          <a:xfrm>
+            <a:off x="753013" y="5058421"/>
+            <a:ext cx="123824" cy="185738"/>
+          </a:xfrm>
+          <a:prstGeom prst="ellipse">
+            <a:avLst/>
+          </a:prstGeom>
+        </p:spPr>
+        <p:style>
+          <a:lnRef idx="2">
+            <a:schemeClr val="accent1">
+              <a:shade val="50000"/>
+            </a:schemeClr>
+          </a:lnRef>
+          <a:fillRef idx="1">
+            <a:schemeClr val="accent1"/>
+          </a:fillRef>
+          <a:effectRef idx="0">
+            <a:schemeClr val="accent1"/>
+          </a:effectRef>
+          <a:fontRef idx="minor">
+            <a:schemeClr val="lt1"/>
+          </a:fontRef>
+        </p:style>
+        <p:txBody>
+          <a:bodyPr rtlCol="0" anchor="ctr"/>
+          <a:lstStyle/>
+          <a:p>
+            <a:pPr algn="ctr"/>
+            <a:endParaRPr lang="en-GB"/>
+          </a:p>
+        </p:txBody>
+      </p:sp>
+      <p:sp>
+        <p:nvSpPr>
+          <p:cNvPr id="17" name="Oval 16">
+            <a:extLst>
+              <a:ext uri="{FF2B5EF4-FFF2-40B4-BE49-F238E27FC236}">
+                <a16:creationId xmlns:a16="http://schemas.microsoft.com/office/drawing/2014/main" id="{6527BB3D-4388-4782-81D5-82AF5E0F6D46}"/>
+              </a:ext>
+            </a:extLst>
+          </p:cNvPr>
+          <p:cNvSpPr/>
+          <p:nvPr/>
+        </p:nvSpPr>
+        <p:spPr>
+          <a:xfrm>
+            <a:off x="753013" y="5579917"/>
+            <a:ext cx="123824" cy="185738"/>
+          </a:xfrm>
+          <a:prstGeom prst="ellipse">
+            <a:avLst/>
+          </a:prstGeom>
+          <a:solidFill>
+            <a:schemeClr val="accent2"/>
+          </a:solidFill>
+        </p:spPr>
+        <p:style>
+          <a:lnRef idx="2">
+            <a:schemeClr val="accent1">
+              <a:shade val="50000"/>
+            </a:schemeClr>
+          </a:lnRef>
+          <a:fillRef idx="1">
+            <a:schemeClr val="accent1"/>
+          </a:fillRef>
+          <a:effectRef idx="0">
+            <a:schemeClr val="accent1"/>
+          </a:effectRef>
+          <a:fontRef idx="minor">
+            <a:schemeClr val="lt1"/>
+          </a:fontRef>
+        </p:style>
+        <p:txBody>
+          <a:bodyPr rtlCol="0" anchor="ctr"/>
+          <a:lstStyle/>
+          <a:p>
+            <a:pPr algn="ctr"/>
+            <a:endParaRPr lang="en-GB"/>
+          </a:p>
+        </p:txBody>
+      </p:sp>
+      <p:sp>
+        <p:nvSpPr>
+          <p:cNvPr id="18" name="Oval 17">
+            <a:extLst>
+              <a:ext uri="{FF2B5EF4-FFF2-40B4-BE49-F238E27FC236}">
+                <a16:creationId xmlns:a16="http://schemas.microsoft.com/office/drawing/2014/main" id="{539107C9-73A5-478E-A8D3-9B2A96ADA1F6}"/>
+              </a:ext>
+            </a:extLst>
+          </p:cNvPr>
+          <p:cNvSpPr/>
+          <p:nvPr/>
+        </p:nvSpPr>
+        <p:spPr>
+          <a:xfrm>
+            <a:off x="753013" y="5793813"/>
+            <a:ext cx="123824" cy="185738"/>
+          </a:xfrm>
+          <a:prstGeom prst="ellipse">
+            <a:avLst/>
+          </a:prstGeom>
+          <a:solidFill>
+            <a:schemeClr val="accent2"/>
+          </a:solidFill>
+        </p:spPr>
+        <p:style>
+          <a:lnRef idx="2">
+            <a:schemeClr val="accent1">
+              <a:shade val="50000"/>
+            </a:schemeClr>
+          </a:lnRef>
+          <a:fillRef idx="1">
+            <a:schemeClr val="accent1"/>
+          </a:fillRef>
+          <a:effectRef idx="0">
+            <a:schemeClr val="accent1"/>
+          </a:effectRef>
+          <a:fontRef idx="minor">
+            <a:schemeClr val="lt1"/>
+          </a:fontRef>
+        </p:style>
+        <p:txBody>
+          <a:bodyPr rtlCol="0" anchor="ctr"/>
+          <a:lstStyle/>
+          <a:p>
+            <a:pPr algn="ctr"/>
+            <a:endParaRPr lang="en-GB"/>
+          </a:p>
+        </p:txBody>
+      </p:sp>
+      <p:sp>
+        <p:nvSpPr>
+          <p:cNvPr id="19" name="Oval 18">
+            <a:extLst>
+              <a:ext uri="{FF2B5EF4-FFF2-40B4-BE49-F238E27FC236}">
+                <a16:creationId xmlns:a16="http://schemas.microsoft.com/office/drawing/2014/main" id="{777E7BC8-D75E-4589-98B8-E8A6616EC786}"/>
+              </a:ext>
+            </a:extLst>
+          </p:cNvPr>
+          <p:cNvSpPr/>
+          <p:nvPr/>
+        </p:nvSpPr>
+        <p:spPr>
+          <a:xfrm>
+            <a:off x="753013" y="6007709"/>
+            <a:ext cx="123824" cy="185738"/>
+          </a:xfrm>
+          <a:prstGeom prst="ellipse">
+            <a:avLst/>
+          </a:prstGeom>
+          <a:solidFill>
+            <a:schemeClr val="accent2"/>
+          </a:solidFill>
+        </p:spPr>
+        <p:style>
+          <a:lnRef idx="2">
+            <a:schemeClr val="accent1">
+              <a:shade val="50000"/>
+            </a:schemeClr>
+          </a:lnRef>
+          <a:fillRef idx="1">
+            <a:schemeClr val="accent1"/>
+          </a:fillRef>
+          <a:effectRef idx="0">
+            <a:schemeClr val="accent1"/>
+          </a:effectRef>
+          <a:fontRef idx="minor">
+            <a:schemeClr val="lt1"/>
+          </a:fontRef>
+        </p:style>
+        <p:txBody>
+          <a:bodyPr rtlCol="0" anchor="ctr"/>
+          <a:lstStyle/>
+          <a:p>
+            <a:pPr algn="ctr"/>
+            <a:endParaRPr lang="en-GB"/>
+          </a:p>
+        </p:txBody>
+      </p:sp>
+      <p:sp>
+        <p:nvSpPr>
+          <p:cNvPr id="20" name="Oval 19">
+            <a:extLst>
+              <a:ext uri="{FF2B5EF4-FFF2-40B4-BE49-F238E27FC236}">
+                <a16:creationId xmlns:a16="http://schemas.microsoft.com/office/drawing/2014/main" id="{823A29D1-5DAC-40CE-AE4E-7D6EB9A9C4CC}"/>
+              </a:ext>
+            </a:extLst>
+          </p:cNvPr>
+          <p:cNvSpPr/>
+          <p:nvPr/>
+        </p:nvSpPr>
+        <p:spPr>
+          <a:xfrm>
+            <a:off x="753013" y="6221605"/>
+            <a:ext cx="123824" cy="185738"/>
+          </a:xfrm>
+          <a:prstGeom prst="ellipse">
+            <a:avLst/>
+          </a:prstGeom>
+          <a:solidFill>
+            <a:schemeClr val="accent2"/>
+          </a:solidFill>
+        </p:spPr>
+        <p:style>
+          <a:lnRef idx="2">
+            <a:schemeClr val="accent1">
+              <a:shade val="50000"/>
+            </a:schemeClr>
+          </a:lnRef>
+          <a:fillRef idx="1">
+            <a:schemeClr val="accent1"/>
+          </a:fillRef>
+          <a:effectRef idx="0">
+            <a:schemeClr val="accent1"/>
+          </a:effectRef>
+          <a:fontRef idx="minor">
+            <a:schemeClr val="lt1"/>
+          </a:fontRef>
+        </p:style>
+        <p:txBody>
+          <a:bodyPr rtlCol="0" anchor="ctr"/>
+          <a:lstStyle/>
+          <a:p>
+            <a:pPr algn="ctr"/>
+            <a:endParaRPr lang="en-GB"/>
+          </a:p>
+        </p:txBody>
+      </p:sp>
+      <p:sp>
+        <p:nvSpPr>
+          <p:cNvPr id="9" name="Oval 8">
+            <a:extLst>
+              <a:ext uri="{FF2B5EF4-FFF2-40B4-BE49-F238E27FC236}">
+                <a16:creationId xmlns:a16="http://schemas.microsoft.com/office/drawing/2014/main" id="{39D32C78-A170-4E96-8381-6D4318E7312A}"/>
+              </a:ext>
+            </a:extLst>
+          </p:cNvPr>
+          <p:cNvSpPr/>
+          <p:nvPr/>
+        </p:nvSpPr>
+        <p:spPr>
+          <a:xfrm>
+            <a:off x="2062700" y="4789001"/>
+            <a:ext cx="400050" cy="435394"/>
+          </a:xfrm>
+          <a:prstGeom prst="ellipse">
+            <a:avLst/>
+          </a:prstGeom>
+          <a:solidFill>
+            <a:srgbClr val="C00000"/>
+          </a:solidFill>
+        </p:spPr>
+        <p:style>
+          <a:lnRef idx="2">
+            <a:schemeClr val="accent1">
+              <a:shade val="50000"/>
+            </a:schemeClr>
+          </a:lnRef>
+          <a:fillRef idx="1">
+            <a:schemeClr val="accent1"/>
+          </a:fillRef>
+          <a:effectRef idx="0">
+            <a:schemeClr val="accent1"/>
+          </a:effectRef>
+          <a:fontRef idx="minor">
+            <a:schemeClr val="lt1"/>
+          </a:fontRef>
+        </p:style>
+        <p:txBody>
+          <a:bodyPr rtlCol="0" anchor="ctr"/>
+          <a:lstStyle/>
+          <a:p>
+            <a:pPr algn="ctr"/>
+            <a:r>
+              <a:rPr lang="el-GR" sz="2800" dirty="0"/>
+              <a:t>σ</a:t>
+            </a:r>
+            <a:endParaRPr lang="en-GB" sz="2800" dirty="0"/>
+          </a:p>
+        </p:txBody>
+      </p:sp>
+      <p:sp>
+        <p:nvSpPr>
+          <p:cNvPr id="24" name="Oval 23">
+            <a:extLst>
+              <a:ext uri="{FF2B5EF4-FFF2-40B4-BE49-F238E27FC236}">
+                <a16:creationId xmlns:a16="http://schemas.microsoft.com/office/drawing/2014/main" id="{A95D9E3D-68B7-4684-9F1F-45E188190CB9}"/>
+              </a:ext>
+            </a:extLst>
+          </p:cNvPr>
+          <p:cNvSpPr/>
+          <p:nvPr/>
+        </p:nvSpPr>
+        <p:spPr>
+          <a:xfrm>
+            <a:off x="2062700" y="5266383"/>
+            <a:ext cx="400050" cy="435394"/>
+          </a:xfrm>
+          <a:prstGeom prst="ellipse">
+            <a:avLst/>
+          </a:prstGeom>
+          <a:solidFill>
+            <a:srgbClr val="C00000"/>
+          </a:solidFill>
+        </p:spPr>
+        <p:style>
+          <a:lnRef idx="2">
+            <a:schemeClr val="accent1">
+              <a:shade val="50000"/>
+            </a:schemeClr>
+          </a:lnRef>
+          <a:fillRef idx="1">
+            <a:schemeClr val="accent1"/>
+          </a:fillRef>
+          <a:effectRef idx="0">
+            <a:schemeClr val="accent1"/>
+          </a:effectRef>
+          <a:fontRef idx="minor">
+            <a:schemeClr val="lt1"/>
+          </a:fontRef>
+        </p:style>
+        <p:txBody>
+          <a:bodyPr rtlCol="0" anchor="ctr"/>
+          <a:lstStyle/>
+          <a:p>
+            <a:pPr algn="ctr"/>
+            <a:r>
+              <a:rPr lang="el-GR" sz="2800" dirty="0"/>
+              <a:t>σ</a:t>
+            </a:r>
+            <a:endParaRPr lang="en-GB" sz="2800" dirty="0"/>
+          </a:p>
+        </p:txBody>
+      </p:sp>
+      <p:sp>
+        <p:nvSpPr>
+          <p:cNvPr id="25" name="Oval 24">
+            <a:extLst>
+              <a:ext uri="{FF2B5EF4-FFF2-40B4-BE49-F238E27FC236}">
+                <a16:creationId xmlns:a16="http://schemas.microsoft.com/office/drawing/2014/main" id="{B29CDED3-9E94-486E-A735-24FAFC34D392}"/>
+              </a:ext>
+            </a:extLst>
+          </p:cNvPr>
+          <p:cNvSpPr/>
+          <p:nvPr/>
+        </p:nvSpPr>
+        <p:spPr>
+          <a:xfrm>
+            <a:off x="2062700" y="5743765"/>
+            <a:ext cx="400050" cy="435394"/>
+          </a:xfrm>
+          <a:prstGeom prst="ellipse">
+            <a:avLst/>
+          </a:prstGeom>
+          <a:solidFill>
+            <a:srgbClr val="C00000"/>
+          </a:solidFill>
+        </p:spPr>
+        <p:style>
+          <a:lnRef idx="2">
+            <a:schemeClr val="accent1">
+              <a:shade val="50000"/>
+            </a:schemeClr>
+          </a:lnRef>
+          <a:fillRef idx="1">
+            <a:schemeClr val="accent1"/>
+          </a:fillRef>
+          <a:effectRef idx="0">
+            <a:schemeClr val="accent1"/>
+          </a:effectRef>
+          <a:fontRef idx="minor">
+            <a:schemeClr val="lt1"/>
+          </a:fontRef>
+        </p:style>
+        <p:txBody>
+          <a:bodyPr rtlCol="0" anchor="ctr"/>
+          <a:lstStyle/>
+          <a:p>
+            <a:pPr algn="ctr"/>
+            <a:r>
+              <a:rPr lang="el-GR" sz="2800" dirty="0"/>
+              <a:t>σ</a:t>
+            </a:r>
+            <a:endParaRPr lang="en-GB" sz="2800" dirty="0"/>
+          </a:p>
+        </p:txBody>
+      </p:sp>
+      <p:sp>
+        <p:nvSpPr>
+          <p:cNvPr id="32" name="Rectangle 31">
+            <a:extLst>
+              <a:ext uri="{FF2B5EF4-FFF2-40B4-BE49-F238E27FC236}">
+                <a16:creationId xmlns:a16="http://schemas.microsoft.com/office/drawing/2014/main" id="{F250BF63-34A4-4A9C-BDD5-216B796FEA88}"/>
+              </a:ext>
+            </a:extLst>
+          </p:cNvPr>
+          <p:cNvSpPr/>
+          <p:nvPr/>
+        </p:nvSpPr>
+        <p:spPr>
+          <a:xfrm>
+            <a:off x="1876962" y="4626285"/>
+            <a:ext cx="776288" cy="1795801"/>
+          </a:xfrm>
+          <a:prstGeom prst="rect">
+            <a:avLst/>
+          </a:prstGeom>
+          <a:noFill/>
+          <a:ln w="28575"/>
+        </p:spPr>
+        <p:style>
+          <a:lnRef idx="2">
+            <a:schemeClr val="accent1">
+              <a:shade val="50000"/>
+            </a:schemeClr>
+          </a:lnRef>
+          <a:fillRef idx="1">
+            <a:schemeClr val="accent1"/>
+          </a:fillRef>
+          <a:effectRef idx="0">
+            <a:schemeClr val="accent1"/>
+          </a:effectRef>
+          <a:fontRef idx="minor">
+            <a:schemeClr val="lt1"/>
+          </a:fontRef>
+        </p:style>
+        <p:txBody>
+          <a:bodyPr rtlCol="0" anchor="ctr"/>
+          <a:lstStyle/>
+          <a:p>
+            <a:pPr algn="ctr"/>
+            <a:endParaRPr lang="en-GB"/>
+          </a:p>
+        </p:txBody>
+      </p:sp>
+      <p:cxnSp>
+        <p:nvCxnSpPr>
+          <p:cNvPr id="35" name="Straight Connector 34">
+            <a:extLst>
+              <a:ext uri="{FF2B5EF4-FFF2-40B4-BE49-F238E27FC236}">
+                <a16:creationId xmlns:a16="http://schemas.microsoft.com/office/drawing/2014/main" id="{9C84526C-7B16-4CFF-A91B-A204D32D1FE9}"/>
+              </a:ext>
+            </a:extLst>
+          </p:cNvPr>
+          <p:cNvCxnSpPr>
+            <a:cxnSpLocks/>
+            <a:stCxn id="7" idx="6"/>
+          </p:cNvCxnSpPr>
+          <p:nvPr/>
+        </p:nvCxnSpPr>
+        <p:spPr>
+          <a:xfrm flipV="1">
+            <a:off x="876837" y="4626286"/>
+            <a:ext cx="995363" cy="92868"/>
+          </a:xfrm>
+          <a:prstGeom prst="line">
+            <a:avLst/>
+          </a:prstGeom>
+        </p:spPr>
+        <p:style>
+          <a:lnRef idx="1">
+            <a:schemeClr val="dk1"/>
+          </a:lnRef>
+          <a:fillRef idx="0">
+            <a:schemeClr val="dk1"/>
+          </a:fillRef>
+          <a:effectRef idx="0">
+            <a:schemeClr val="dk1"/>
+          </a:effectRef>
+          <a:fontRef idx="minor">
+            <a:schemeClr val="tx1"/>
+          </a:fontRef>
+        </p:style>
+      </p:cxnSp>
+      <p:cxnSp>
+        <p:nvCxnSpPr>
+          <p:cNvPr id="40" name="Straight Connector 39">
+            <a:extLst>
+              <a:ext uri="{FF2B5EF4-FFF2-40B4-BE49-F238E27FC236}">
+                <a16:creationId xmlns:a16="http://schemas.microsoft.com/office/drawing/2014/main" id="{66FB6B26-1FC4-47E9-83ED-3C0870744FAD}"/>
+              </a:ext>
+            </a:extLst>
+          </p:cNvPr>
+          <p:cNvCxnSpPr>
+            <a:cxnSpLocks/>
+            <a:stCxn id="20" idx="6"/>
+          </p:cNvCxnSpPr>
+          <p:nvPr/>
+        </p:nvCxnSpPr>
+        <p:spPr>
+          <a:xfrm>
+            <a:off x="876837" y="6314474"/>
+            <a:ext cx="995363" cy="92869"/>
+          </a:xfrm>
+          <a:prstGeom prst="line">
+            <a:avLst/>
+          </a:prstGeom>
+        </p:spPr>
+        <p:style>
+          <a:lnRef idx="1">
+            <a:schemeClr val="dk1"/>
+          </a:lnRef>
+          <a:fillRef idx="0">
+            <a:schemeClr val="dk1"/>
+          </a:fillRef>
+          <a:effectRef idx="0">
+            <a:schemeClr val="dk1"/>
+          </a:effectRef>
+          <a:fontRef idx="minor">
+            <a:schemeClr val="tx1"/>
+          </a:fontRef>
+        </p:style>
+      </p:cxnSp>
+      <p:sp>
+        <p:nvSpPr>
+          <p:cNvPr id="41" name="TextBox 40">
+            <a:extLst>
+              <a:ext uri="{FF2B5EF4-FFF2-40B4-BE49-F238E27FC236}">
+                <a16:creationId xmlns:a16="http://schemas.microsoft.com/office/drawing/2014/main" id="{F1D9BD30-F814-4E6F-8CBE-9DABAA268A2F}"/>
+              </a:ext>
+            </a:extLst>
+          </p:cNvPr>
+          <p:cNvSpPr txBox="1"/>
+          <p:nvPr/>
+        </p:nvSpPr>
+        <p:spPr>
+          <a:xfrm rot="16200000">
+            <a:off x="315695" y="4729210"/>
+            <a:ext cx="482312" cy="369332"/>
+          </a:xfrm>
+          <a:prstGeom prst="rect">
+            <a:avLst/>
+          </a:prstGeom>
+          <a:noFill/>
+        </p:spPr>
+        <p:txBody>
+          <a:bodyPr wrap="none" rtlCol="0">
+            <a:spAutoFit/>
+          </a:bodyPr>
+          <a:lstStyle/>
+          <a:p>
+            <a:r>
+              <a:rPr lang="en-GB" b="1" i="1" dirty="0"/>
+              <a:t>h</a:t>
+            </a:r>
+            <a:r>
+              <a:rPr lang="en-GB" b="1" i="1" baseline="-25000" dirty="0"/>
+              <a:t>t-1</a:t>
+            </a:r>
+            <a:endParaRPr lang="en-GB" b="1" i="1" dirty="0"/>
+          </a:p>
+        </p:txBody>
+      </p:sp>
+      <p:sp>
+        <p:nvSpPr>
+          <p:cNvPr id="44" name="TextBox 43">
+            <a:extLst>
+              <a:ext uri="{FF2B5EF4-FFF2-40B4-BE49-F238E27FC236}">
+                <a16:creationId xmlns:a16="http://schemas.microsoft.com/office/drawing/2014/main" id="{DF7CB58B-B0F9-4749-B166-ED3D24542F91}"/>
+              </a:ext>
+            </a:extLst>
+          </p:cNvPr>
+          <p:cNvSpPr txBox="1"/>
+          <p:nvPr/>
+        </p:nvSpPr>
+        <p:spPr>
+          <a:xfrm rot="16200000">
+            <a:off x="303796" y="5794885"/>
+            <a:ext cx="343364" cy="369332"/>
+          </a:xfrm>
+          <a:prstGeom prst="rect">
+            <a:avLst/>
+          </a:prstGeom>
+          <a:noFill/>
+        </p:spPr>
+        <p:txBody>
+          <a:bodyPr wrap="none" rtlCol="0">
+            <a:spAutoFit/>
+          </a:bodyPr>
+          <a:lstStyle/>
+          <a:p>
+            <a:r>
+              <a:rPr lang="en-GB" b="1" i="1" dirty="0" err="1"/>
+              <a:t>x</a:t>
+            </a:r>
+            <a:r>
+              <a:rPr lang="en-GB" b="1" i="1" baseline="-25000" dirty="0" err="1"/>
+              <a:t>t</a:t>
+            </a:r>
+            <a:endParaRPr lang="en-GB" b="1" i="1" dirty="0"/>
+          </a:p>
+        </p:txBody>
+      </p:sp>
+      <p:cxnSp>
+        <p:nvCxnSpPr>
+          <p:cNvPr id="43" name="Straight Arrow Connector 42">
+            <a:extLst>
+              <a:ext uri="{FF2B5EF4-FFF2-40B4-BE49-F238E27FC236}">
+                <a16:creationId xmlns:a16="http://schemas.microsoft.com/office/drawing/2014/main" id="{05B984E3-9DC0-4B71-BC36-90B8D307012C}"/>
+              </a:ext>
+            </a:extLst>
+          </p:cNvPr>
+          <p:cNvCxnSpPr>
+            <a:stCxn id="9" idx="6"/>
+          </p:cNvCxnSpPr>
+          <p:nvPr/>
+        </p:nvCxnSpPr>
+        <p:spPr>
+          <a:xfrm>
+            <a:off x="2462750" y="5006698"/>
+            <a:ext cx="575726" cy="0"/>
+          </a:xfrm>
+          <a:prstGeom prst="straightConnector1">
+            <a:avLst/>
+          </a:prstGeom>
+          <a:ln w="12700">
+            <a:tailEnd type="triangle"/>
+          </a:ln>
+        </p:spPr>
+        <p:style>
+          <a:lnRef idx="1">
+            <a:schemeClr val="dk1"/>
+          </a:lnRef>
+          <a:fillRef idx="0">
+            <a:schemeClr val="dk1"/>
+          </a:fillRef>
+          <a:effectRef idx="0">
+            <a:schemeClr val="dk1"/>
+          </a:effectRef>
+          <a:fontRef idx="minor">
+            <a:schemeClr val="tx1"/>
+          </a:fontRef>
+        </p:style>
+      </p:cxnSp>
+      <p:cxnSp>
+        <p:nvCxnSpPr>
+          <p:cNvPr id="47" name="Straight Arrow Connector 46">
+            <a:extLst>
+              <a:ext uri="{FF2B5EF4-FFF2-40B4-BE49-F238E27FC236}">
+                <a16:creationId xmlns:a16="http://schemas.microsoft.com/office/drawing/2014/main" id="{910D956B-D21F-411E-AE3B-8340B4D38349}"/>
+              </a:ext>
+            </a:extLst>
+          </p:cNvPr>
+          <p:cNvCxnSpPr>
+            <a:cxnSpLocks/>
+            <a:stCxn id="24" idx="6"/>
+          </p:cNvCxnSpPr>
+          <p:nvPr/>
+        </p:nvCxnSpPr>
+        <p:spPr>
+          <a:xfrm>
+            <a:off x="2462750" y="5484080"/>
+            <a:ext cx="575726" cy="0"/>
+          </a:xfrm>
+          <a:prstGeom prst="straightConnector1">
+            <a:avLst/>
+          </a:prstGeom>
+          <a:ln w="12700">
+            <a:tailEnd type="triangle"/>
+          </a:ln>
+        </p:spPr>
+        <p:style>
+          <a:lnRef idx="1">
+            <a:schemeClr val="dk1"/>
+          </a:lnRef>
+          <a:fillRef idx="0">
+            <a:schemeClr val="dk1"/>
+          </a:fillRef>
+          <a:effectRef idx="0">
+            <a:schemeClr val="dk1"/>
+          </a:effectRef>
+          <a:fontRef idx="minor">
+            <a:schemeClr val="tx1"/>
+          </a:fontRef>
+        </p:style>
+      </p:cxnSp>
+      <p:cxnSp>
+        <p:nvCxnSpPr>
+          <p:cNvPr id="50" name="Straight Arrow Connector 49">
+            <a:extLst>
+              <a:ext uri="{FF2B5EF4-FFF2-40B4-BE49-F238E27FC236}">
+                <a16:creationId xmlns:a16="http://schemas.microsoft.com/office/drawing/2014/main" id="{19201244-E3AD-4292-B90D-3F6823836825}"/>
+              </a:ext>
+            </a:extLst>
+          </p:cNvPr>
+          <p:cNvCxnSpPr>
+            <a:cxnSpLocks/>
+            <a:stCxn id="25" idx="6"/>
+          </p:cNvCxnSpPr>
+          <p:nvPr/>
+        </p:nvCxnSpPr>
+        <p:spPr>
+          <a:xfrm flipV="1">
+            <a:off x="2462750" y="5951324"/>
+            <a:ext cx="575726" cy="10138"/>
+          </a:xfrm>
+          <a:prstGeom prst="straightConnector1">
+            <a:avLst/>
+          </a:prstGeom>
+          <a:ln w="12700">
+            <a:tailEnd type="triangle"/>
+          </a:ln>
+        </p:spPr>
+        <p:style>
+          <a:lnRef idx="1">
+            <a:schemeClr val="dk1"/>
+          </a:lnRef>
+          <a:fillRef idx="0">
+            <a:schemeClr val="dk1"/>
+          </a:fillRef>
+          <a:effectRef idx="0">
+            <a:schemeClr val="dk1"/>
+          </a:effectRef>
+          <a:fontRef idx="minor">
+            <a:schemeClr val="tx1"/>
+          </a:fontRef>
+        </p:style>
+      </p:cxnSp>
+      <p:sp>
+        <p:nvSpPr>
+          <p:cNvPr id="51" name="TextBox 50">
+            <a:extLst>
+              <a:ext uri="{FF2B5EF4-FFF2-40B4-BE49-F238E27FC236}">
+                <a16:creationId xmlns:a16="http://schemas.microsoft.com/office/drawing/2014/main" id="{F1104F2A-586D-44E4-BAA5-560151278B2D}"/>
+              </a:ext>
+            </a:extLst>
+          </p:cNvPr>
+          <p:cNvSpPr txBox="1"/>
+          <p:nvPr/>
+        </p:nvSpPr>
+        <p:spPr>
+          <a:xfrm>
+            <a:off x="2634436" y="4660931"/>
+            <a:ext cx="385042" cy="369332"/>
+          </a:xfrm>
+          <a:prstGeom prst="rect">
+            <a:avLst/>
+          </a:prstGeom>
+          <a:noFill/>
+        </p:spPr>
+        <p:txBody>
+          <a:bodyPr wrap="none" rtlCol="0">
+            <a:spAutoFit/>
+          </a:bodyPr>
+          <a:lstStyle/>
+          <a:p>
+            <a:r>
+              <a:rPr lang="en-GB" b="1" dirty="0"/>
+              <a:t>b</a:t>
+            </a:r>
+            <a:r>
+              <a:rPr lang="en-GB" b="1" baseline="-25000" dirty="0"/>
+              <a:t>1</a:t>
+            </a:r>
+            <a:endParaRPr lang="en-GB" b="1" dirty="0"/>
+          </a:p>
+        </p:txBody>
+      </p:sp>
+      <p:sp>
+        <p:nvSpPr>
+          <p:cNvPr id="54" name="TextBox 53">
+            <a:extLst>
+              <a:ext uri="{FF2B5EF4-FFF2-40B4-BE49-F238E27FC236}">
+                <a16:creationId xmlns:a16="http://schemas.microsoft.com/office/drawing/2014/main" id="{B74C02E3-AE2F-4D1E-B290-D07E570DB39A}"/>
+              </a:ext>
+            </a:extLst>
+          </p:cNvPr>
+          <p:cNvSpPr txBox="1"/>
+          <p:nvPr/>
+        </p:nvSpPr>
+        <p:spPr>
+          <a:xfrm>
+            <a:off x="2621170" y="5143263"/>
+            <a:ext cx="386644" cy="369332"/>
+          </a:xfrm>
+          <a:prstGeom prst="rect">
+            <a:avLst/>
+          </a:prstGeom>
+          <a:noFill/>
+        </p:spPr>
+        <p:txBody>
+          <a:bodyPr wrap="none" rtlCol="0">
+            <a:spAutoFit/>
+          </a:bodyPr>
+          <a:lstStyle/>
+          <a:p>
+            <a:r>
+              <a:rPr lang="en-GB" b="1" dirty="0"/>
+              <a:t>b</a:t>
+            </a:r>
+            <a:r>
+              <a:rPr lang="en-GB" b="1" baseline="-25000" dirty="0"/>
+              <a:t>2</a:t>
+            </a:r>
+            <a:endParaRPr lang="en-GB" b="1" dirty="0"/>
+          </a:p>
+        </p:txBody>
+      </p:sp>
+      <p:sp>
+        <p:nvSpPr>
+          <p:cNvPr id="55" name="TextBox 54">
+            <a:extLst>
+              <a:ext uri="{FF2B5EF4-FFF2-40B4-BE49-F238E27FC236}">
+                <a16:creationId xmlns:a16="http://schemas.microsoft.com/office/drawing/2014/main" id="{6DD16833-9D9B-44A0-8555-1523C90B7955}"/>
+              </a:ext>
+            </a:extLst>
+          </p:cNvPr>
+          <p:cNvSpPr txBox="1"/>
+          <p:nvPr/>
+        </p:nvSpPr>
+        <p:spPr>
+          <a:xfrm>
+            <a:off x="2632834" y="5623203"/>
+            <a:ext cx="386644" cy="369332"/>
+          </a:xfrm>
+          <a:prstGeom prst="rect">
+            <a:avLst/>
+          </a:prstGeom>
+          <a:noFill/>
+        </p:spPr>
+        <p:txBody>
+          <a:bodyPr wrap="none" rtlCol="0">
+            <a:spAutoFit/>
+          </a:bodyPr>
+          <a:lstStyle/>
+          <a:p>
+            <a:r>
+              <a:rPr lang="en-GB" b="1" dirty="0"/>
+              <a:t>b</a:t>
+            </a:r>
+            <a:r>
+              <a:rPr lang="en-GB" b="1" baseline="-25000" dirty="0"/>
+              <a:t>3</a:t>
+            </a:r>
+            <a:endParaRPr lang="en-GB" b="1" dirty="0"/>
+          </a:p>
+        </p:txBody>
+      </p:sp>
+      <p:sp>
+        <p:nvSpPr>
+          <p:cNvPr id="56" name="TextBox 55">
+            <a:extLst>
+              <a:ext uri="{FF2B5EF4-FFF2-40B4-BE49-F238E27FC236}">
+                <a16:creationId xmlns:a16="http://schemas.microsoft.com/office/drawing/2014/main" id="{DEBEAA6E-BA6D-4FBF-BE6D-2E7FFD2B82C3}"/>
+              </a:ext>
+            </a:extLst>
+          </p:cNvPr>
+          <p:cNvSpPr txBox="1"/>
+          <p:nvPr/>
+        </p:nvSpPr>
+        <p:spPr>
+          <a:xfrm>
+            <a:off x="3013636" y="4832171"/>
+            <a:ext cx="336952" cy="369332"/>
+          </a:xfrm>
+          <a:prstGeom prst="rect">
+            <a:avLst/>
+          </a:prstGeom>
+          <a:noFill/>
+        </p:spPr>
+        <p:txBody>
+          <a:bodyPr wrap="none" rtlCol="0">
+            <a:spAutoFit/>
+          </a:bodyPr>
+          <a:lstStyle/>
+          <a:p>
+            <a:r>
+              <a:rPr lang="en-GB" b="1" dirty="0"/>
+              <a:t>f</a:t>
+            </a:r>
+            <a:r>
+              <a:rPr lang="en-GB" b="1" baseline="-25000" dirty="0"/>
+              <a:t>1</a:t>
+            </a:r>
+            <a:endParaRPr lang="en-GB" b="1" dirty="0"/>
+          </a:p>
+        </p:txBody>
+      </p:sp>
+      <p:sp>
+        <p:nvSpPr>
+          <p:cNvPr id="57" name="TextBox 56">
+            <a:extLst>
+              <a:ext uri="{FF2B5EF4-FFF2-40B4-BE49-F238E27FC236}">
+                <a16:creationId xmlns:a16="http://schemas.microsoft.com/office/drawing/2014/main" id="{A46B1231-7A74-4D26-9A83-E81B8D12814C}"/>
+              </a:ext>
+            </a:extLst>
+          </p:cNvPr>
+          <p:cNvSpPr txBox="1"/>
+          <p:nvPr/>
+        </p:nvSpPr>
+        <p:spPr>
+          <a:xfrm>
+            <a:off x="3022821" y="5270900"/>
+            <a:ext cx="336952" cy="369332"/>
+          </a:xfrm>
+          <a:prstGeom prst="rect">
+            <a:avLst/>
+          </a:prstGeom>
+          <a:noFill/>
+        </p:spPr>
+        <p:txBody>
+          <a:bodyPr wrap="none" rtlCol="0">
+            <a:spAutoFit/>
+          </a:bodyPr>
+          <a:lstStyle/>
+          <a:p>
+            <a:r>
+              <a:rPr lang="en-GB" b="1" dirty="0"/>
+              <a:t>f</a:t>
+            </a:r>
+            <a:r>
+              <a:rPr lang="en-GB" b="1" baseline="-25000" dirty="0"/>
+              <a:t>2</a:t>
+            </a:r>
+            <a:endParaRPr lang="en-GB" b="1" dirty="0"/>
+          </a:p>
+        </p:txBody>
+      </p:sp>
+      <p:sp>
+        <p:nvSpPr>
+          <p:cNvPr id="58" name="TextBox 57">
+            <a:extLst>
+              <a:ext uri="{FF2B5EF4-FFF2-40B4-BE49-F238E27FC236}">
+                <a16:creationId xmlns:a16="http://schemas.microsoft.com/office/drawing/2014/main" id="{61A20B04-7BC5-4492-AB69-848CA38F9DA5}"/>
+              </a:ext>
+            </a:extLst>
+          </p:cNvPr>
+          <p:cNvSpPr txBox="1"/>
+          <p:nvPr/>
+        </p:nvSpPr>
+        <p:spPr>
+          <a:xfrm>
+            <a:off x="3000695" y="5794885"/>
+            <a:ext cx="336952" cy="369332"/>
+          </a:xfrm>
+          <a:prstGeom prst="rect">
+            <a:avLst/>
+          </a:prstGeom>
+          <a:noFill/>
+        </p:spPr>
+        <p:txBody>
+          <a:bodyPr wrap="none" rtlCol="0">
+            <a:spAutoFit/>
+          </a:bodyPr>
+          <a:lstStyle/>
+          <a:p>
+            <a:r>
+              <a:rPr lang="en-GB" b="1" dirty="0"/>
+              <a:t>f</a:t>
+            </a:r>
+            <a:r>
+              <a:rPr lang="en-GB" b="1" baseline="-25000" dirty="0"/>
+              <a:t>3</a:t>
+            </a:r>
+            <a:endParaRPr lang="en-GB" b="1" dirty="0"/>
+          </a:p>
+        </p:txBody>
+      </p:sp>
+      <p:sp>
+        <p:nvSpPr>
+          <p:cNvPr id="52" name="TextBox 51">
+            <a:extLst>
+              <a:ext uri="{FF2B5EF4-FFF2-40B4-BE49-F238E27FC236}">
+                <a16:creationId xmlns:a16="http://schemas.microsoft.com/office/drawing/2014/main" id="{C66D810D-1B88-4F83-AA93-0282AEBBB4D8}"/>
+              </a:ext>
+            </a:extLst>
+          </p:cNvPr>
+          <p:cNvSpPr txBox="1"/>
+          <p:nvPr/>
+        </p:nvSpPr>
+        <p:spPr>
+          <a:xfrm>
+            <a:off x="3618185" y="5224395"/>
+            <a:ext cx="1399742" cy="369332"/>
+          </a:xfrm>
+          <a:prstGeom prst="rect">
+            <a:avLst/>
+          </a:prstGeom>
+          <a:noFill/>
+        </p:spPr>
+        <p:txBody>
+          <a:bodyPr wrap="none" rtlCol="0">
+            <a:spAutoFit/>
+          </a:bodyPr>
+          <a:lstStyle/>
+          <a:p>
+            <a:r>
+              <a:rPr lang="en-GB" b="1" dirty="0"/>
+              <a:t>[f</a:t>
+            </a:r>
+            <a:r>
+              <a:rPr lang="en-GB" b="1" baseline="-25000" dirty="0"/>
+              <a:t>1</a:t>
+            </a:r>
+            <a:r>
+              <a:rPr lang="en-GB" b="1" dirty="0"/>
+              <a:t>, f</a:t>
+            </a:r>
+            <a:r>
+              <a:rPr lang="en-GB" b="1" baseline="-25000" dirty="0"/>
+              <a:t>2 </a:t>
+            </a:r>
+            <a:r>
+              <a:rPr lang="en-GB" b="1" dirty="0"/>
+              <a:t>, f</a:t>
+            </a:r>
+            <a:r>
+              <a:rPr lang="en-GB" b="1" baseline="-25000" dirty="0"/>
+              <a:t>3</a:t>
+            </a:r>
+            <a:r>
+              <a:rPr lang="en-GB" b="1" dirty="0"/>
+              <a:t>] = f</a:t>
+            </a:r>
+            <a:r>
+              <a:rPr lang="en-GB" b="1" baseline="-25000" dirty="0"/>
+              <a:t>t</a:t>
+            </a:r>
+            <a:endParaRPr lang="en-GB" b="1" dirty="0"/>
+          </a:p>
+        </p:txBody>
+      </p:sp>
+      <p:cxnSp>
+        <p:nvCxnSpPr>
+          <p:cNvPr id="59" name="Straight Arrow Connector 58">
+            <a:extLst>
+              <a:ext uri="{FF2B5EF4-FFF2-40B4-BE49-F238E27FC236}">
+                <a16:creationId xmlns:a16="http://schemas.microsoft.com/office/drawing/2014/main" id="{39AB69E6-0006-45D9-A3F2-26CD3A5EED47}"/>
+              </a:ext>
+            </a:extLst>
+          </p:cNvPr>
+          <p:cNvCxnSpPr>
+            <a:cxnSpLocks/>
+          </p:cNvCxnSpPr>
+          <p:nvPr/>
+        </p:nvCxnSpPr>
+        <p:spPr>
+          <a:xfrm>
+            <a:off x="1443038" y="3614738"/>
+            <a:ext cx="429162" cy="918329"/>
+          </a:xfrm>
+          <a:prstGeom prst="straightConnector1">
+            <a:avLst/>
+          </a:prstGeom>
+          <a:ln w="38100">
+            <a:tailEnd type="triangle"/>
+          </a:ln>
+        </p:spPr>
+        <p:style>
+          <a:lnRef idx="1">
+            <a:schemeClr val="dk1"/>
+          </a:lnRef>
+          <a:fillRef idx="0">
+            <a:schemeClr val="dk1"/>
+          </a:fillRef>
+          <a:effectRef idx="0">
+            <a:schemeClr val="dk1"/>
+          </a:effectRef>
+          <a:fontRef idx="minor">
+            <a:schemeClr val="tx1"/>
+          </a:fontRef>
+        </p:style>
+      </p:cxnSp>
+    </p:spTree>
+    <p:extLst>
+      <p:ext uri="{BB962C8B-B14F-4D97-AF65-F5344CB8AC3E}">
+        <p14:creationId xmlns:p14="http://schemas.microsoft.com/office/powerpoint/2010/main" val="2857479038"/>
+      </p:ext>
+    </p:extLst>
+  </p:cSld>
+  <p:clrMapOvr>
+    <a:masterClrMapping/>
+  </p:clrMapOvr>
+</p:sld>
+</file>
+
+<file path=ppt/slides/slide17.xml><?xml version="1.0" encoding="utf-8"?>
+<p:sld xmlns:a="http://schemas.openxmlformats.org/drawingml/2006/main" xmlns:r="http://schemas.openxmlformats.org/officeDocument/2006/relationships" xmlns:p="http://schemas.openxmlformats.org/presentationml/2006/main">
+  <p:cSld>
+    <p:spTree>
+      <p:nvGrpSpPr>
+        <p:cNvPr id="1" name=""/>
+        <p:cNvGrpSpPr/>
+        <p:nvPr/>
+      </p:nvGrpSpPr>
+      <p:grpSpPr>
+        <a:xfrm>
+          <a:off x="0" y="0"/>
+          <a:ext cx="0" cy="0"/>
+          <a:chOff x="0" y="0"/>
+          <a:chExt cx="0" cy="0"/>
+        </a:xfrm>
+      </p:grpSpPr>
+      <p:sp>
+        <p:nvSpPr>
+          <p:cNvPr id="2" name="Title 1">
+            <a:extLst>
+              <a:ext uri="{FF2B5EF4-FFF2-40B4-BE49-F238E27FC236}">
+                <a16:creationId xmlns:a16="http://schemas.microsoft.com/office/drawing/2014/main" id="{CFABE5EB-9E83-41BA-8D1F-143C19D21BA7}"/>
+              </a:ext>
+            </a:extLst>
+          </p:cNvPr>
+          <p:cNvSpPr>
+            <a:spLocks noGrp="1"/>
+          </p:cNvSpPr>
+          <p:nvPr>
+            <p:ph type="title"/>
+          </p:nvPr>
+        </p:nvSpPr>
+        <p:spPr>
+          <a:xfrm>
+            <a:off x="838200" y="407988"/>
+            <a:ext cx="10515600" cy="749300"/>
+          </a:xfrm>
+        </p:spPr>
+        <p:txBody>
+          <a:bodyPr>
+            <a:normAutofit/>
+          </a:bodyPr>
+          <a:lstStyle/>
+          <a:p>
+            <a:pPr algn="ctr"/>
+            <a:r>
+              <a:rPr lang="en-GB" sz="3600" b="1" dirty="0">
+                <a:latin typeface="Bell MT" panose="02020503060305020303" pitchFamily="18" charset="0"/>
+              </a:rPr>
+              <a:t>LSTM Gate Operation</a:t>
+            </a:r>
+          </a:p>
+        </p:txBody>
+      </p:sp>
+      <p:pic>
+        <p:nvPicPr>
+          <p:cNvPr id="7" name="Picture 6">
+            <a:extLst>
+              <a:ext uri="{FF2B5EF4-FFF2-40B4-BE49-F238E27FC236}">
+                <a16:creationId xmlns:a16="http://schemas.microsoft.com/office/drawing/2014/main" id="{6FEBEE34-C5C1-425C-AF32-9A44E94AA222}"/>
+              </a:ext>
+            </a:extLst>
+          </p:cNvPr>
+          <p:cNvPicPr>
+            <a:picLocks noChangeAspect="1"/>
+          </p:cNvPicPr>
+          <p:nvPr/>
+        </p:nvPicPr>
+        <p:blipFill>
+          <a:blip r:embed="rId2">
+            <a:extLst>
+              <a:ext uri="{28A0092B-C50C-407E-A947-70E740481C1C}">
+                <a14:useLocalDpi xmlns:a14="http://schemas.microsoft.com/office/drawing/2010/main" val="0"/>
+              </a:ext>
+            </a:extLst>
+          </a:blip>
+          <a:stretch>
+            <a:fillRect/>
+          </a:stretch>
+        </p:blipFill>
+        <p:spPr>
+          <a:xfrm>
+            <a:off x="997760" y="1328737"/>
+            <a:ext cx="10356040" cy="5121275"/>
+          </a:xfrm>
+          <a:prstGeom prst="rect">
+            <a:avLst/>
+          </a:prstGeom>
+        </p:spPr>
+      </p:pic>
+    </p:spTree>
+    <p:extLst>
+      <p:ext uri="{BB962C8B-B14F-4D97-AF65-F5344CB8AC3E}">
+        <p14:creationId xmlns:p14="http://schemas.microsoft.com/office/powerpoint/2010/main" val="2598610315"/>
+      </p:ext>
+    </p:extLst>
+  </p:cSld>
+  <p:clrMapOvr>
+    <a:masterClrMapping/>
+  </p:clrMapOvr>
+</p:sld>
+</file>
+
+<file path=ppt/slides/slide18.xml><?xml version="1.0" encoding="utf-8"?>
+<p:sld xmlns:a="http://schemas.openxmlformats.org/drawingml/2006/main" xmlns:r="http://schemas.openxmlformats.org/officeDocument/2006/relationships" xmlns:p="http://schemas.openxmlformats.org/presentationml/2006/main">
+  <p:cSld>
+    <p:spTree>
+      <p:nvGrpSpPr>
+        <p:cNvPr id="1" name=""/>
+        <p:cNvGrpSpPr/>
+        <p:nvPr/>
+      </p:nvGrpSpPr>
+      <p:grpSpPr>
+        <a:xfrm>
+          <a:off x="0" y="0"/>
+          <a:ext cx="0" cy="0"/>
+          <a:chOff x="0" y="0"/>
+          <a:chExt cx="0" cy="0"/>
+        </a:xfrm>
+      </p:grpSpPr>
+      <p:sp>
+        <p:nvSpPr>
+          <p:cNvPr id="2" name="Title 1">
+            <a:extLst>
+              <a:ext uri="{FF2B5EF4-FFF2-40B4-BE49-F238E27FC236}">
+                <a16:creationId xmlns:a16="http://schemas.microsoft.com/office/drawing/2014/main" id="{CFABE5EB-9E83-41BA-8D1F-143C19D21BA7}"/>
+              </a:ext>
+            </a:extLst>
+          </p:cNvPr>
+          <p:cNvSpPr>
+            <a:spLocks noGrp="1"/>
+          </p:cNvSpPr>
+          <p:nvPr>
+            <p:ph type="title"/>
+          </p:nvPr>
+        </p:nvSpPr>
+        <p:spPr>
+          <a:xfrm>
+            <a:off x="838200" y="407988"/>
+            <a:ext cx="10515600" cy="749300"/>
+          </a:xfrm>
+        </p:spPr>
+        <p:txBody>
+          <a:bodyPr>
+            <a:normAutofit/>
+          </a:bodyPr>
+          <a:lstStyle/>
+          <a:p>
+            <a:pPr algn="ctr"/>
+            <a:r>
+              <a:rPr lang="en-GB" sz="3600" b="1" dirty="0">
+                <a:latin typeface="Bell MT" panose="02020503060305020303" pitchFamily="18" charset="0"/>
+              </a:rPr>
+              <a:t>LSTM Gate Operation</a:t>
+            </a:r>
+          </a:p>
+        </p:txBody>
+      </p:sp>
+      <p:pic>
+        <p:nvPicPr>
+          <p:cNvPr id="4" name="Picture 3">
+            <a:extLst>
+              <a:ext uri="{FF2B5EF4-FFF2-40B4-BE49-F238E27FC236}">
+                <a16:creationId xmlns:a16="http://schemas.microsoft.com/office/drawing/2014/main" id="{0BDA8388-9C00-4ADF-8649-59C44924EA2F}"/>
+              </a:ext>
+            </a:extLst>
+          </p:cNvPr>
+          <p:cNvPicPr>
+            <a:picLocks noChangeAspect="1"/>
+          </p:cNvPicPr>
+          <p:nvPr/>
+        </p:nvPicPr>
+        <p:blipFill>
+          <a:blip r:embed="rId2">
+            <a:extLst>
+              <a:ext uri="{28A0092B-C50C-407E-A947-70E740481C1C}">
+                <a14:useLocalDpi xmlns:a14="http://schemas.microsoft.com/office/drawing/2010/main" val="0"/>
+              </a:ext>
+            </a:extLst>
+          </a:blip>
+          <a:stretch>
+            <a:fillRect/>
+          </a:stretch>
+        </p:blipFill>
+        <p:spPr>
+          <a:xfrm>
+            <a:off x="1478756" y="1157288"/>
+            <a:ext cx="8774907" cy="5275660"/>
+          </a:xfrm>
+          <a:prstGeom prst="rect">
+            <a:avLst/>
+          </a:prstGeom>
+        </p:spPr>
+      </p:pic>
+    </p:spTree>
+    <p:extLst>
+      <p:ext uri="{BB962C8B-B14F-4D97-AF65-F5344CB8AC3E}">
+        <p14:creationId xmlns:p14="http://schemas.microsoft.com/office/powerpoint/2010/main" val="236714266"/>
+      </p:ext>
+    </p:extLst>
+  </p:cSld>
+  <p:clrMapOvr>
+    <a:masterClrMapping/>
+  </p:clrMapOvr>
+</p:sld>
+</file>
+
+<file path=ppt/slides/slide19.xml><?xml version="1.0" encoding="utf-8"?>
+<p:sld xmlns:a="http://schemas.openxmlformats.org/drawingml/2006/main" xmlns:r="http://schemas.openxmlformats.org/officeDocument/2006/relationships" xmlns:p="http://schemas.openxmlformats.org/presentationml/2006/main">
+  <p:cSld>
+    <p:spTree>
+      <p:nvGrpSpPr>
+        <p:cNvPr id="1" name=""/>
+        <p:cNvGrpSpPr/>
+        <p:nvPr/>
+      </p:nvGrpSpPr>
+      <p:grpSpPr>
+        <a:xfrm>
+          <a:off x="0" y="0"/>
+          <a:ext cx="0" cy="0"/>
+          <a:chOff x="0" y="0"/>
+          <a:chExt cx="0" cy="0"/>
+        </a:xfrm>
+      </p:grpSpPr>
+      <p:sp>
+        <p:nvSpPr>
+          <p:cNvPr id="2" name="Title 1">
+            <a:extLst>
+              <a:ext uri="{FF2B5EF4-FFF2-40B4-BE49-F238E27FC236}">
+                <a16:creationId xmlns:a16="http://schemas.microsoft.com/office/drawing/2014/main" id="{CFABE5EB-9E83-41BA-8D1F-143C19D21BA7}"/>
+              </a:ext>
+            </a:extLst>
+          </p:cNvPr>
+          <p:cNvSpPr>
+            <a:spLocks noGrp="1"/>
+          </p:cNvSpPr>
+          <p:nvPr>
+            <p:ph type="title"/>
+          </p:nvPr>
+        </p:nvSpPr>
+        <p:spPr>
+          <a:xfrm>
+            <a:off x="838200" y="407988"/>
+            <a:ext cx="10515600" cy="749300"/>
+          </a:xfrm>
+        </p:spPr>
+        <p:txBody>
+          <a:bodyPr>
+            <a:normAutofit/>
+          </a:bodyPr>
+          <a:lstStyle/>
+          <a:p>
+            <a:pPr algn="ctr"/>
+            <a:r>
+              <a:rPr lang="en-GB" sz="3600" b="1" dirty="0">
+                <a:latin typeface="Bell MT" panose="02020503060305020303" pitchFamily="18" charset="0"/>
+              </a:rPr>
+              <a:t>References</a:t>
+            </a:r>
+          </a:p>
+        </p:txBody>
+      </p:sp>
+      <p:sp>
+        <p:nvSpPr>
+          <p:cNvPr id="3" name="Content Placeholder 2">
+            <a:extLst>
+              <a:ext uri="{FF2B5EF4-FFF2-40B4-BE49-F238E27FC236}">
+                <a16:creationId xmlns:a16="http://schemas.microsoft.com/office/drawing/2014/main" id="{2961E73A-AF99-4C8F-8C7F-4C12887BFECE}"/>
+              </a:ext>
+            </a:extLst>
+          </p:cNvPr>
+          <p:cNvSpPr>
+            <a:spLocks noGrp="1"/>
+          </p:cNvSpPr>
+          <p:nvPr>
+            <p:ph idx="1"/>
+          </p:nvPr>
+        </p:nvSpPr>
+        <p:spPr>
+          <a:xfrm>
+            <a:off x="838200" y="1739899"/>
+            <a:ext cx="10515600" cy="3017838"/>
+          </a:xfrm>
+        </p:spPr>
+        <p:txBody>
+          <a:bodyPr>
+            <a:normAutofit/>
+          </a:bodyPr>
+          <a:lstStyle/>
+          <a:p>
+            <a:pPr>
+              <a:buFont typeface="Wingdings" panose="05000000000000000000" pitchFamily="2" charset="2"/>
+              <a:buChar char="Ø"/>
+            </a:pPr>
+            <a:r>
+              <a:rPr lang="en-GB" sz="2000" dirty="0">
+                <a:latin typeface="Bell MT" panose="02020503060305020303" pitchFamily="18" charset="0"/>
+                <a:hlinkClick r:id="rId2"/>
+              </a:rPr>
+              <a:t>https://colah.github.io/posts/2015-08-Understanding-LSTMs/</a:t>
+            </a:r>
+            <a:r>
+              <a:rPr lang="en-GB" sz="2000" dirty="0">
+                <a:latin typeface="Bell MT" panose="02020503060305020303" pitchFamily="18" charset="0"/>
+              </a:rPr>
+              <a:t> </a:t>
+            </a:r>
+          </a:p>
+          <a:p>
+            <a:pPr>
+              <a:buFont typeface="Wingdings" panose="05000000000000000000" pitchFamily="2" charset="2"/>
+              <a:buChar char="Ø"/>
+            </a:pPr>
+            <a:endParaRPr lang="en-GB" sz="2000" dirty="0">
+              <a:latin typeface="Bell MT" panose="02020503060305020303" pitchFamily="18" charset="0"/>
+            </a:endParaRPr>
+          </a:p>
+          <a:p>
+            <a:pPr>
+              <a:buFont typeface="Wingdings" panose="05000000000000000000" pitchFamily="2" charset="2"/>
+              <a:buChar char="Ø"/>
+            </a:pPr>
+            <a:endParaRPr lang="en-GB" sz="2000" dirty="0">
+              <a:latin typeface="Bell MT" panose="02020503060305020303" pitchFamily="18" charset="0"/>
+            </a:endParaRPr>
+          </a:p>
+        </p:txBody>
+      </p:sp>
+    </p:spTree>
+    <p:extLst>
+      <p:ext uri="{BB962C8B-B14F-4D97-AF65-F5344CB8AC3E}">
+        <p14:creationId xmlns:p14="http://schemas.microsoft.com/office/powerpoint/2010/main" val="3277042890"/>
       </p:ext>
     </p:extLst>
   </p:cSld>
@@ -5229,8 +9054,8 @@
         </p:nvSpPr>
         <p:spPr>
           <a:xfrm>
-            <a:off x="4957763" y="557213"/>
-            <a:ext cx="2523612" cy="461665"/>
+            <a:off x="4957762" y="557213"/>
+            <a:ext cx="3036497" cy="461665"/>
           </a:xfrm>
           <a:prstGeom prst="rect">
             <a:avLst/>
@@ -5244,7 +9069,9 @@
           <a:lstStyle/>
           <a:p>
             <a:r>
-              <a:rPr lang="en-GB" sz="2400" b="1" dirty="0"/>
+              <a:rPr lang="en-GB" sz="2400" b="1" dirty="0">
+                <a:latin typeface="Bell MT" panose="02020503060305020303" pitchFamily="18" charset="0"/>
+              </a:rPr>
               <a:t>RNN Architecture</a:t>
             </a:r>
           </a:p>
@@ -7011,7 +10838,7 @@
         <p:spPr>
           <a:xfrm>
             <a:off x="4957763" y="557213"/>
-            <a:ext cx="2523612" cy="461665"/>
+            <a:ext cx="3144914" cy="461665"/>
           </a:xfrm>
           <a:prstGeom prst="rect">
             <a:avLst/>
@@ -7025,7 +10852,9 @@
           <a:lstStyle/>
           <a:p>
             <a:r>
-              <a:rPr lang="en-GB" sz="2400" b="1" dirty="0"/>
+              <a:rPr lang="en-GB" sz="2400" b="1" dirty="0">
+                <a:latin typeface="Bell MT" panose="02020503060305020303" pitchFamily="18" charset="0"/>
+              </a:rPr>
               <a:t>RNN Architecture</a:t>
             </a:r>
           </a:p>
@@ -12961,8 +16790,8 @@
           </a:p>
         </p:txBody>
       </p:sp>
-      <mc:AlternateContent xmlns:mc="http://schemas.openxmlformats.org/markup-compatibility/2006">
-        <mc:Choice xmlns:a14="http://schemas.microsoft.com/office/drawing/2010/main" Requires="a14">
+      <mc:AlternateContent xmlns:mc="http://schemas.openxmlformats.org/markup-compatibility/2006" xmlns:a14="http://schemas.microsoft.com/office/drawing/2010/main">
+        <mc:Choice Requires="a14">
           <p:sp>
             <p:nvSpPr>
               <p:cNvPr id="5" name="TextBox 4">
@@ -13235,7 +17064,7 @@
             </p:txBody>
           </p:sp>
         </mc:Choice>
-        <mc:Fallback>
+        <mc:Fallback xmlns="">
           <p:sp>
             <p:nvSpPr>
               <p:cNvPr id="5" name="TextBox 4">
@@ -14268,8 +18097,8 @@
           </a:fontRef>
         </p:style>
       </p:cxnSp>
-      <mc:AlternateContent xmlns:mc="http://schemas.openxmlformats.org/markup-compatibility/2006">
-        <mc:Choice xmlns:a14="http://schemas.microsoft.com/office/drawing/2010/main" Requires="a14">
+      <mc:AlternateContent xmlns:mc="http://schemas.openxmlformats.org/markup-compatibility/2006" xmlns:a14="http://schemas.microsoft.com/office/drawing/2010/main">
+        <mc:Choice Requires="a14">
           <p:sp>
             <p:nvSpPr>
               <p:cNvPr id="81" name="TextBox 80">
@@ -14542,7 +18371,7 @@
             </p:txBody>
           </p:sp>
         </mc:Choice>
-        <mc:Fallback>
+        <mc:Fallback xmlns="">
           <p:sp>
             <p:nvSpPr>
               <p:cNvPr id="81" name="TextBox 80">
@@ -14587,8 +18416,8 @@
           </p:sp>
         </mc:Fallback>
       </mc:AlternateContent>
-      <mc:AlternateContent xmlns:mc="http://schemas.openxmlformats.org/markup-compatibility/2006">
-        <mc:Choice xmlns:a14="http://schemas.microsoft.com/office/drawing/2010/main" Requires="a14">
+      <mc:AlternateContent xmlns:mc="http://schemas.openxmlformats.org/markup-compatibility/2006" xmlns:a14="http://schemas.microsoft.com/office/drawing/2010/main">
+        <mc:Choice Requires="a14">
           <p:sp>
             <p:nvSpPr>
               <p:cNvPr id="84" name="TextBox 83">
@@ -14733,7 +18562,7 @@
             </p:txBody>
           </p:sp>
         </mc:Choice>
-        <mc:Fallback>
+        <mc:Fallback xmlns="">
           <p:sp>
             <p:nvSpPr>
               <p:cNvPr id="84" name="TextBox 83">
@@ -14778,8 +18607,8 @@
           </p:sp>
         </mc:Fallback>
       </mc:AlternateContent>
-      <mc:AlternateContent xmlns:mc="http://schemas.openxmlformats.org/markup-compatibility/2006">
-        <mc:Choice xmlns:a14="http://schemas.microsoft.com/office/drawing/2010/main" Requires="a14">
+      <mc:AlternateContent xmlns:mc="http://schemas.openxmlformats.org/markup-compatibility/2006" xmlns:a14="http://schemas.microsoft.com/office/drawing/2010/main">
+        <mc:Choice Requires="a14">
           <p:sp>
             <p:nvSpPr>
               <p:cNvPr id="85" name="TextBox 84">
@@ -14895,7 +18724,7 @@
             </p:txBody>
           </p:sp>
         </mc:Choice>
-        <mc:Fallback>
+        <mc:Fallback xmlns="">
           <p:sp>
             <p:nvSpPr>
               <p:cNvPr id="85" name="TextBox 84">
@@ -14940,8 +18769,8 @@
           </p:sp>
         </mc:Fallback>
       </mc:AlternateContent>
-      <mc:AlternateContent xmlns:mc="http://schemas.openxmlformats.org/markup-compatibility/2006">
-        <mc:Choice xmlns:a14="http://schemas.microsoft.com/office/drawing/2010/main" Requires="a14">
+      <mc:AlternateContent xmlns:mc="http://schemas.openxmlformats.org/markup-compatibility/2006" xmlns:a14="http://schemas.microsoft.com/office/drawing/2010/main">
+        <mc:Choice Requires="a14">
           <p:sp>
             <p:nvSpPr>
               <p:cNvPr id="86" name="TextBox 85">
@@ -15057,7 +18886,7 @@
             </p:txBody>
           </p:sp>
         </mc:Choice>
-        <mc:Fallback>
+        <mc:Fallback xmlns="">
           <p:sp>
             <p:nvSpPr>
               <p:cNvPr id="86" name="TextBox 85">
@@ -15102,8 +18931,8 @@
           </p:sp>
         </mc:Fallback>
       </mc:AlternateContent>
-      <mc:AlternateContent xmlns:mc="http://schemas.openxmlformats.org/markup-compatibility/2006">
-        <mc:Choice xmlns:a14="http://schemas.microsoft.com/office/drawing/2010/main" Requires="a14">
+      <mc:AlternateContent xmlns:mc="http://schemas.openxmlformats.org/markup-compatibility/2006" xmlns:a14="http://schemas.microsoft.com/office/drawing/2010/main">
+        <mc:Choice Requires="a14">
           <p:sp>
             <p:nvSpPr>
               <p:cNvPr id="88" name="TextBox 87">
@@ -15272,7 +19101,7 @@
             </p:txBody>
           </p:sp>
         </mc:Choice>
-        <mc:Fallback>
+        <mc:Fallback xmlns="">
           <p:sp>
             <p:nvSpPr>
               <p:cNvPr id="88" name="TextBox 87">
@@ -15317,8 +19146,8 @@
           </p:sp>
         </mc:Fallback>
       </mc:AlternateContent>
-      <mc:AlternateContent xmlns:mc="http://schemas.openxmlformats.org/markup-compatibility/2006">
-        <mc:Choice xmlns:a14="http://schemas.microsoft.com/office/drawing/2010/main" Requires="a14">
+      <mc:AlternateContent xmlns:mc="http://schemas.openxmlformats.org/markup-compatibility/2006" xmlns:a14="http://schemas.microsoft.com/office/drawing/2010/main">
+        <mc:Choice Requires="a14">
           <p:sp>
             <p:nvSpPr>
               <p:cNvPr id="89" name="TextBox 88">
@@ -15434,7 +19263,7 @@
             </p:txBody>
           </p:sp>
         </mc:Choice>
-        <mc:Fallback>
+        <mc:Fallback xmlns="">
           <p:sp>
             <p:nvSpPr>
               <p:cNvPr id="89" name="TextBox 88">
@@ -15479,8 +19308,8 @@
           </p:sp>
         </mc:Fallback>
       </mc:AlternateContent>
-      <mc:AlternateContent xmlns:mc="http://schemas.openxmlformats.org/markup-compatibility/2006">
-        <mc:Choice xmlns:a14="http://schemas.microsoft.com/office/drawing/2010/main" Requires="a14">
+      <mc:AlternateContent xmlns:mc="http://schemas.openxmlformats.org/markup-compatibility/2006" xmlns:a14="http://schemas.microsoft.com/office/drawing/2010/main">
+        <mc:Choice Requires="a14">
           <p:sp>
             <p:nvSpPr>
               <p:cNvPr id="90" name="TextBox 89">
@@ -15596,7 +19425,7 @@
             </p:txBody>
           </p:sp>
         </mc:Choice>
-        <mc:Fallback>
+        <mc:Fallback xmlns="">
           <p:sp>
             <p:nvSpPr>
               <p:cNvPr id="90" name="TextBox 89">
@@ -15641,8 +19470,8 @@
           </p:sp>
         </mc:Fallback>
       </mc:AlternateContent>
-      <mc:AlternateContent xmlns:mc="http://schemas.openxmlformats.org/markup-compatibility/2006">
-        <mc:Choice xmlns:a14="http://schemas.microsoft.com/office/drawing/2010/main" Requires="a14">
+      <mc:AlternateContent xmlns:mc="http://schemas.openxmlformats.org/markup-compatibility/2006" xmlns:a14="http://schemas.microsoft.com/office/drawing/2010/main">
+        <mc:Choice Requires="a14">
           <p:sp>
             <p:nvSpPr>
               <p:cNvPr id="94" name="TextBox 93">
@@ -15915,7 +19744,7 @@
             </p:txBody>
           </p:sp>
         </mc:Choice>
-        <mc:Fallback>
+        <mc:Fallback xmlns="">
           <p:sp>
             <p:nvSpPr>
               <p:cNvPr id="94" name="TextBox 93">
@@ -15960,8 +19789,8 @@
           </p:sp>
         </mc:Fallback>
       </mc:AlternateContent>
-      <mc:AlternateContent xmlns:mc="http://schemas.openxmlformats.org/markup-compatibility/2006">
-        <mc:Choice xmlns:a14="http://schemas.microsoft.com/office/drawing/2010/main" Requires="a14">
+      <mc:AlternateContent xmlns:mc="http://schemas.openxmlformats.org/markup-compatibility/2006" xmlns:a14="http://schemas.microsoft.com/office/drawing/2010/main">
+        <mc:Choice Requires="a14">
           <p:sp>
             <p:nvSpPr>
               <p:cNvPr id="95" name="TextBox 94">
@@ -16106,7 +19935,7 @@
             </p:txBody>
           </p:sp>
         </mc:Choice>
-        <mc:Fallback>
+        <mc:Fallback xmlns="">
           <p:sp>
             <p:nvSpPr>
               <p:cNvPr id="95" name="TextBox 94">
@@ -16151,8 +19980,8 @@
           </p:sp>
         </mc:Fallback>
       </mc:AlternateContent>
-      <mc:AlternateContent xmlns:mc="http://schemas.openxmlformats.org/markup-compatibility/2006">
-        <mc:Choice xmlns:a14="http://schemas.microsoft.com/office/drawing/2010/main" Requires="a14">
+      <mc:AlternateContent xmlns:mc="http://schemas.openxmlformats.org/markup-compatibility/2006" xmlns:a14="http://schemas.microsoft.com/office/drawing/2010/main">
+        <mc:Choice Requires="a14">
           <p:sp>
             <p:nvSpPr>
               <p:cNvPr id="96" name="TextBox 95">
@@ -16268,7 +20097,7 @@
             </p:txBody>
           </p:sp>
         </mc:Choice>
-        <mc:Fallback>
+        <mc:Fallback xmlns="">
           <p:sp>
             <p:nvSpPr>
               <p:cNvPr id="96" name="TextBox 95">
@@ -16313,8 +20142,8 @@
           </p:sp>
         </mc:Fallback>
       </mc:AlternateContent>
-      <mc:AlternateContent xmlns:mc="http://schemas.openxmlformats.org/markup-compatibility/2006">
-        <mc:Choice xmlns:a14="http://schemas.microsoft.com/office/drawing/2010/main" Requires="a14">
+      <mc:AlternateContent xmlns:mc="http://schemas.openxmlformats.org/markup-compatibility/2006" xmlns:a14="http://schemas.microsoft.com/office/drawing/2010/main">
+        <mc:Choice Requires="a14">
           <p:sp>
             <p:nvSpPr>
               <p:cNvPr id="97" name="TextBox 96">
@@ -16430,7 +20259,7 @@
             </p:txBody>
           </p:sp>
         </mc:Choice>
-        <mc:Fallback>
+        <mc:Fallback xmlns="">
           <p:sp>
             <p:nvSpPr>
               <p:cNvPr id="97" name="TextBox 96">
@@ -18557,8 +22386,8 @@
           </a:fontRef>
         </p:style>
       </p:cxnSp>
-      <mc:AlternateContent xmlns:mc="http://schemas.openxmlformats.org/markup-compatibility/2006">
-        <mc:Choice xmlns:a14="http://schemas.microsoft.com/office/drawing/2010/main" Requires="a14">
+      <mc:AlternateContent xmlns:mc="http://schemas.openxmlformats.org/markup-compatibility/2006" xmlns:a14="http://schemas.microsoft.com/office/drawing/2010/main">
+        <mc:Choice Requires="a14">
           <p:sp>
             <p:nvSpPr>
               <p:cNvPr id="94" name="TextBox 93">
@@ -18587,6 +22416,7 @@
               </a:bodyPr>
               <a:lstStyle/>
               <a:p>
+                <a:pPr/>
                 <a14:m>
                   <m:oMathPara xmlns:m="http://schemas.openxmlformats.org/officeDocument/2006/math">
                     <m:oMathParaPr>
@@ -18724,7 +22554,7 @@
             </p:txBody>
           </p:sp>
         </mc:Choice>
-        <mc:Fallback>
+        <mc:Fallback xmlns="">
           <p:sp>
             <p:nvSpPr>
               <p:cNvPr id="94" name="TextBox 93">
@@ -18769,8 +22599,8 @@
           </p:sp>
         </mc:Fallback>
       </mc:AlternateContent>
-      <mc:AlternateContent xmlns:mc="http://schemas.openxmlformats.org/markup-compatibility/2006">
-        <mc:Choice xmlns:a14="http://schemas.microsoft.com/office/drawing/2010/main" Requires="a14">
+      <mc:AlternateContent xmlns:mc="http://schemas.openxmlformats.org/markup-compatibility/2006" xmlns:a14="http://schemas.microsoft.com/office/drawing/2010/main">
+        <mc:Choice Requires="a14">
           <p:sp>
             <p:nvSpPr>
               <p:cNvPr id="95" name="TextBox 94">
@@ -18799,6 +22629,7 @@
               </a:bodyPr>
               <a:lstStyle/>
               <a:p>
+                <a:pPr/>
                 <a14:m>
                   <m:oMathPara xmlns:m="http://schemas.openxmlformats.org/officeDocument/2006/math">
                     <m:oMathParaPr>
@@ -18862,7 +22693,7 @@
             </p:txBody>
           </p:sp>
         </mc:Choice>
-        <mc:Fallback>
+        <mc:Fallback xmlns="">
           <p:sp>
             <p:nvSpPr>
               <p:cNvPr id="95" name="TextBox 94">
@@ -18907,8 +22738,8 @@
           </p:sp>
         </mc:Fallback>
       </mc:AlternateContent>
-      <mc:AlternateContent xmlns:mc="http://schemas.openxmlformats.org/markup-compatibility/2006">
-        <mc:Choice xmlns:a14="http://schemas.microsoft.com/office/drawing/2010/main" Requires="a14">
+      <mc:AlternateContent xmlns:mc="http://schemas.openxmlformats.org/markup-compatibility/2006" xmlns:a14="http://schemas.microsoft.com/office/drawing/2010/main">
+        <mc:Choice Requires="a14">
           <p:sp>
             <p:nvSpPr>
               <p:cNvPr id="96" name="TextBox 95">
@@ -18937,6 +22768,7 @@
               </a:bodyPr>
               <a:lstStyle/>
               <a:p>
+                <a:pPr/>
                 <a14:m>
                   <m:oMathPara xmlns:m="http://schemas.openxmlformats.org/officeDocument/2006/math">
                     <m:oMathParaPr>
@@ -19023,7 +22855,7 @@
             </p:txBody>
           </p:sp>
         </mc:Choice>
-        <mc:Fallback>
+        <mc:Fallback xmlns="">
           <p:sp>
             <p:nvSpPr>
               <p:cNvPr id="96" name="TextBox 95">
@@ -19068,8 +22900,8 @@
           </p:sp>
         </mc:Fallback>
       </mc:AlternateContent>
-      <mc:AlternateContent xmlns:mc="http://schemas.openxmlformats.org/markup-compatibility/2006">
-        <mc:Choice xmlns:a14="http://schemas.microsoft.com/office/drawing/2010/main" Requires="a14">
+      <mc:AlternateContent xmlns:mc="http://schemas.openxmlformats.org/markup-compatibility/2006" xmlns:a14="http://schemas.microsoft.com/office/drawing/2010/main">
+        <mc:Choice Requires="a14">
           <p:sp>
             <p:nvSpPr>
               <p:cNvPr id="97" name="TextBox 96">
@@ -19098,6 +22930,7 @@
               </a:bodyPr>
               <a:lstStyle/>
               <a:p>
+                <a:pPr/>
                 <a14:m>
                   <m:oMathPara xmlns:m="http://schemas.openxmlformats.org/officeDocument/2006/math">
                     <m:oMathParaPr>
@@ -19154,7 +22987,7 @@
             </p:txBody>
           </p:sp>
         </mc:Choice>
-        <mc:Fallback>
+        <mc:Fallback xmlns="">
           <p:sp>
             <p:nvSpPr>
               <p:cNvPr id="97" name="TextBox 96">
@@ -19239,10 +23072,245 @@
           </a:p>
         </p:txBody>
       </p:sp>
+      <p:pic>
+        <p:nvPicPr>
+          <p:cNvPr id="4" name="Picture 3">
+            <a:extLst>
+              <a:ext uri="{FF2B5EF4-FFF2-40B4-BE49-F238E27FC236}">
+                <a16:creationId xmlns:a16="http://schemas.microsoft.com/office/drawing/2014/main" id="{E8EA6EED-0EE5-4949-85F0-AE1758A1B014}"/>
+              </a:ext>
+            </a:extLst>
+          </p:cNvPr>
+          <p:cNvPicPr>
+            <a:picLocks noChangeAspect="1"/>
+          </p:cNvPicPr>
+          <p:nvPr/>
+        </p:nvPicPr>
+        <p:blipFill>
+          <a:blip r:embed="rId6">
+            <a:extLst>
+              <a:ext uri="{28A0092B-C50C-407E-A947-70E740481C1C}">
+                <a14:useLocalDpi xmlns:a14="http://schemas.microsoft.com/office/drawing/2010/main" val="0"/>
+              </a:ext>
+            </a:extLst>
+          </a:blip>
+          <a:stretch>
+            <a:fillRect/>
+          </a:stretch>
+        </p:blipFill>
+        <p:spPr>
+          <a:xfrm>
+            <a:off x="4997312" y="3876792"/>
+            <a:ext cx="6718438" cy="2323983"/>
+          </a:xfrm>
+          <a:prstGeom prst="rect">
+            <a:avLst/>
+          </a:prstGeom>
+        </p:spPr>
+      </p:pic>
+      <p:sp>
+        <p:nvSpPr>
+          <p:cNvPr id="5" name="TextBox 4">
+            <a:extLst>
+              <a:ext uri="{FF2B5EF4-FFF2-40B4-BE49-F238E27FC236}">
+                <a16:creationId xmlns:a16="http://schemas.microsoft.com/office/drawing/2014/main" id="{DD822C27-7B92-46C5-9478-ECEBD39E7182}"/>
+              </a:ext>
+            </a:extLst>
+          </p:cNvPr>
+          <p:cNvSpPr txBox="1"/>
+          <p:nvPr/>
+        </p:nvSpPr>
+        <p:spPr>
+          <a:xfrm>
+            <a:off x="7657168" y="3271500"/>
+            <a:ext cx="2702343" cy="369332"/>
+          </a:xfrm>
+          <a:prstGeom prst="rect">
+            <a:avLst/>
+          </a:prstGeom>
+          <a:noFill/>
+        </p:spPr>
+        <p:txBody>
+          <a:bodyPr wrap="none" rtlCol="0">
+            <a:spAutoFit/>
+          </a:bodyPr>
+          <a:lstStyle/>
+          <a:p>
+            <a:r>
+              <a:rPr lang="en-GB" b="1" dirty="0"/>
+              <a:t>A single RNN Architecture </a:t>
+            </a:r>
+          </a:p>
+        </p:txBody>
+      </p:sp>
     </p:spTree>
     <p:extLst>
       <p:ext uri="{BB962C8B-B14F-4D97-AF65-F5344CB8AC3E}">
         <p14:creationId xmlns:p14="http://schemas.microsoft.com/office/powerpoint/2010/main" val="1057511724"/>
+      </p:ext>
+    </p:extLst>
+  </p:cSld>
+  <p:clrMapOvr>
+    <a:masterClrMapping/>
+  </p:clrMapOvr>
+</p:sld>
+</file>
+
+<file path=ppt/slides/slide9.xml><?xml version="1.0" encoding="utf-8"?>
+<p:sld xmlns:a="http://schemas.openxmlformats.org/drawingml/2006/main" xmlns:r="http://schemas.openxmlformats.org/officeDocument/2006/relationships" xmlns:p="http://schemas.openxmlformats.org/presentationml/2006/main">
+  <p:cSld>
+    <p:spTree>
+      <p:nvGrpSpPr>
+        <p:cNvPr id="1" name=""/>
+        <p:cNvGrpSpPr/>
+        <p:nvPr/>
+      </p:nvGrpSpPr>
+      <p:grpSpPr>
+        <a:xfrm>
+          <a:off x="0" y="0"/>
+          <a:ext cx="0" cy="0"/>
+          <a:chOff x="0" y="0"/>
+          <a:chExt cx="0" cy="0"/>
+        </a:xfrm>
+      </p:grpSpPr>
+      <p:sp>
+        <p:nvSpPr>
+          <p:cNvPr id="2" name="Title 1">
+            <a:extLst>
+              <a:ext uri="{FF2B5EF4-FFF2-40B4-BE49-F238E27FC236}">
+                <a16:creationId xmlns:a16="http://schemas.microsoft.com/office/drawing/2014/main" id="{CB60FBFF-2614-4F92-9F9B-EDD5EF0A8CBE}"/>
+              </a:ext>
+            </a:extLst>
+          </p:cNvPr>
+          <p:cNvSpPr>
+            <a:spLocks noGrp="1"/>
+          </p:cNvSpPr>
+          <p:nvPr>
+            <p:ph type="title"/>
+          </p:nvPr>
+        </p:nvSpPr>
+        <p:spPr>
+          <a:xfrm>
+            <a:off x="838200" y="365125"/>
+            <a:ext cx="10515600" cy="720725"/>
+          </a:xfrm>
+        </p:spPr>
+        <p:txBody>
+          <a:bodyPr>
+            <a:normAutofit/>
+          </a:bodyPr>
+          <a:lstStyle/>
+          <a:p>
+            <a:pPr algn="ctr"/>
+            <a:r>
+              <a:rPr lang="en-GB" sz="3600" b="1" dirty="0">
+                <a:latin typeface="Bell MT" panose="02020503060305020303" pitchFamily="18" charset="0"/>
+              </a:rPr>
+              <a:t>Problem with RNN</a:t>
+            </a:r>
+          </a:p>
+        </p:txBody>
+      </p:sp>
+      <p:sp>
+        <p:nvSpPr>
+          <p:cNvPr id="3" name="Content Placeholder 2">
+            <a:extLst>
+              <a:ext uri="{FF2B5EF4-FFF2-40B4-BE49-F238E27FC236}">
+                <a16:creationId xmlns:a16="http://schemas.microsoft.com/office/drawing/2014/main" id="{F409F433-DA00-4F9C-92B2-0E876264A864}"/>
+              </a:ext>
+            </a:extLst>
+          </p:cNvPr>
+          <p:cNvSpPr>
+            <a:spLocks noGrp="1"/>
+          </p:cNvSpPr>
+          <p:nvPr>
+            <p:ph idx="1"/>
+          </p:nvPr>
+        </p:nvSpPr>
+        <p:spPr>
+          <a:xfrm>
+            <a:off x="838200" y="1253331"/>
+            <a:ext cx="10515600" cy="4890294"/>
+          </a:xfrm>
+        </p:spPr>
+        <p:txBody>
+          <a:bodyPr>
+            <a:normAutofit/>
+          </a:bodyPr>
+          <a:lstStyle/>
+          <a:p>
+            <a:pPr marL="0" indent="0">
+              <a:buNone/>
+            </a:pPr>
+            <a:r>
+              <a:rPr lang="en-GB" sz="2000" dirty="0">
+                <a:latin typeface="Bell MT" panose="02020503060305020303" pitchFamily="18" charset="0"/>
+              </a:rPr>
+              <a:t>Recurrent Neural Networks (RNNs) are a type of neural network architecture commonly used for sequential data processing tasks, such as natural language processing and time series analysis. However, RNNs have several limitations and problems, which have led to the development of more advanced architectures like Long Short-Term Memory (LSTM) and Gated Recurrent Unit (GRU). Here are some of the key problems associated with basic RNNs:</a:t>
+            </a:r>
+          </a:p>
+          <a:p>
+            <a:pPr marL="0" indent="0">
+              <a:buNone/>
+            </a:pPr>
+            <a:endParaRPr lang="en-GB" sz="2000" dirty="0">
+              <a:latin typeface="Bell MT" panose="02020503060305020303" pitchFamily="18" charset="0"/>
+            </a:endParaRPr>
+          </a:p>
+          <a:p>
+            <a:r>
+              <a:rPr lang="en-GB" sz="2000" b="1" dirty="0">
+                <a:latin typeface="Bell MT" panose="02020503060305020303" pitchFamily="18" charset="0"/>
+              </a:rPr>
+              <a:t>Vanishing Gradients:</a:t>
+            </a:r>
+            <a:r>
+              <a:rPr lang="en-GB" sz="2000" dirty="0">
+                <a:latin typeface="Bell MT" panose="02020503060305020303" pitchFamily="18" charset="0"/>
+              </a:rPr>
+              <a:t> RNNs are prone to the vanishing gradient problem, where gradients become very small as they are backpropagated through time during training. This issue makes it difficult for the network to learn </a:t>
+            </a:r>
+            <a:r>
+              <a:rPr lang="en-GB" sz="2000" b="1" dirty="0">
+                <a:latin typeface="Bell MT" panose="02020503060305020303" pitchFamily="18" charset="0"/>
+              </a:rPr>
+              <a:t>long-range dependencies in sequences.</a:t>
+            </a:r>
+          </a:p>
+          <a:p>
+            <a:r>
+              <a:rPr lang="en-GB" sz="2000" b="1" dirty="0">
+                <a:latin typeface="Bell MT" panose="02020503060305020303" pitchFamily="18" charset="0"/>
+              </a:rPr>
+              <a:t>Exploding Gradients:</a:t>
+            </a:r>
+            <a:r>
+              <a:rPr lang="en-GB" sz="2000" dirty="0">
+                <a:latin typeface="Bell MT" panose="02020503060305020303" pitchFamily="18" charset="0"/>
+              </a:rPr>
+              <a:t> Conversely, RNNs can also suffer from exploding gradient problems, where gradients grow exponentially during training. This can lead to numerical instability and make training difficult.</a:t>
+            </a:r>
+          </a:p>
+          <a:p>
+            <a:r>
+              <a:rPr lang="en-GB" sz="2000" b="1" dirty="0">
+                <a:latin typeface="Bell MT" panose="02020503060305020303" pitchFamily="18" charset="0"/>
+              </a:rPr>
+              <a:t>Short-Term Memory: </a:t>
+            </a:r>
+            <a:r>
+              <a:rPr lang="en-GB" sz="2000" dirty="0">
+                <a:latin typeface="Bell MT" panose="02020503060305020303" pitchFamily="18" charset="0"/>
+              </a:rPr>
+              <a:t>Basic RNNs have a limited ability to capture long-range dependencies in sequences. They are often better suited for modeling short-term dependencies but struggle with tasks requiring a longer context.</a:t>
+            </a:r>
+          </a:p>
+        </p:txBody>
+      </p:sp>
+    </p:spTree>
+    <p:extLst>
+      <p:ext uri="{BB962C8B-B14F-4D97-AF65-F5344CB8AC3E}">
+        <p14:creationId xmlns:p14="http://schemas.microsoft.com/office/powerpoint/2010/main" val="4293058251"/>
       </p:ext>
     </p:extLst>
   </p:cSld>

</xml_diff>